<commit_message>
added completion certi and report files
</commit_message>
<xml_diff>
--- a/MALWARE DETECTION USING ML.pptx
+++ b/MALWARE DETECTION USING ML.pptx
@@ -5,10 +5,10 @@
     <p:sldMasterId id="2147483648" r:id="rId4"/>
   </p:sldMasterIdLst>
   <p:notesMasterIdLst>
-    <p:notesMasterId r:id="rId18"/>
+    <p:notesMasterId r:id="rId21"/>
   </p:notesMasterIdLst>
   <p:handoutMasterIdLst>
-    <p:handoutMasterId r:id="rId19"/>
+    <p:handoutMasterId r:id="rId22"/>
   </p:handoutMasterIdLst>
   <p:sldIdLst>
     <p:sldId id="256" r:id="rId5"/>
@@ -21,9 +21,12 @@
     <p:sldId id="288" r:id="rId12"/>
     <p:sldId id="259" r:id="rId13"/>
     <p:sldId id="287" r:id="rId14"/>
-    <p:sldId id="264" r:id="rId15"/>
-    <p:sldId id="266" r:id="rId16"/>
-    <p:sldId id="271" r:id="rId17"/>
+    <p:sldId id="289" r:id="rId15"/>
+    <p:sldId id="290" r:id="rId16"/>
+    <p:sldId id="291" r:id="rId17"/>
+    <p:sldId id="264" r:id="rId18"/>
+    <p:sldId id="266" r:id="rId19"/>
+    <p:sldId id="271" r:id="rId20"/>
   </p:sldIdLst>
   <p:sldSz cx="12192000" cy="6858000"/>
   <p:notesSz cx="6858000" cy="9144000"/>
@@ -1086,19 +1089,7 @@
             <a:rPr lang="en-US" sz="1400" spc="50" baseline="0" dirty="0">
               <a:latin typeface="+mn-lt"/>
             </a:rPr>
-            <a:t>100 </a:t>
-          </a:r>
-          <a:r>
-            <a:rPr lang="en-US" sz="1400" spc="50" baseline="0" dirty="0" err="1">
-              <a:latin typeface="+mn-lt"/>
-            </a:rPr>
-            <a:t>api</a:t>
-          </a:r>
-          <a:r>
-            <a:rPr lang="en-US" sz="1400" spc="50" baseline="0" dirty="0">
-              <a:latin typeface="+mn-lt"/>
-            </a:rPr>
-            <a:t> call sequence log file for malware and benign files from Kaggle.</a:t>
+            <a:t>100 API call sequence log file for malware and benign files from Kaggle.</a:t>
           </a:r>
         </a:p>
       </dgm:t>
@@ -1219,7 +1210,7 @@
             <a:rPr lang="en-US" sz="1400" spc="50" baseline="0" dirty="0">
               <a:latin typeface="+mn-lt"/>
             </a:rPr>
-            <a:t> call analysis through mathematical tools.</a:t>
+            <a:t> call analysis through mathematical tools, Dataset target variable evaluation.</a:t>
           </a:r>
         </a:p>
       </dgm:t>
@@ -1827,7 +1818,7 @@
       </dsp:nvSpPr>
       <dsp:spPr>
         <a:xfrm>
-          <a:off x="13760" y="569285"/>
+          <a:off x="13760" y="565087"/>
           <a:ext cx="2011384" cy="603415"/>
         </a:xfrm>
         <a:prstGeom prst="rect">
@@ -1928,7 +1919,7 @@
         </a:p>
       </dsp:txBody>
       <dsp:txXfrm>
-        <a:off x="13760" y="569285"/>
+        <a:off x="13760" y="565087"/>
         <a:ext cx="2011384" cy="603415"/>
       </dsp:txXfrm>
     </dsp:sp>
@@ -1939,8 +1930,8 @@
       </dsp:nvSpPr>
       <dsp:spPr>
         <a:xfrm>
-          <a:off x="13760" y="1172701"/>
-          <a:ext cx="2011384" cy="2002926"/>
+          <a:off x="13760" y="1168502"/>
+          <a:ext cx="2011384" cy="2011323"/>
         </a:xfrm>
         <a:prstGeom prst="rect">
           <a:avLst/>
@@ -2005,25 +1996,13 @@
             <a:rPr lang="en-US" sz="1400" kern="1200" spc="50" baseline="0" dirty="0">
               <a:latin typeface="+mn-lt"/>
             </a:rPr>
-            <a:t>100 </a:t>
-          </a:r>
-          <a:r>
-            <a:rPr lang="en-US" sz="1400" kern="1200" spc="50" baseline="0" dirty="0" err="1">
-              <a:latin typeface="+mn-lt"/>
-            </a:rPr>
-            <a:t>api</a:t>
-          </a:r>
-          <a:r>
-            <a:rPr lang="en-US" sz="1400" kern="1200" spc="50" baseline="0" dirty="0">
-              <a:latin typeface="+mn-lt"/>
-            </a:rPr>
-            <a:t> call sequence log file for malware and benign files from Kaggle.</a:t>
+            <a:t>100 API call sequence log file for malware and benign files from Kaggle.</a:t>
           </a:r>
         </a:p>
       </dsp:txBody>
       <dsp:txXfrm>
-        <a:off x="13760" y="1172701"/>
-        <a:ext cx="2011384" cy="2002926"/>
+        <a:off x="13760" y="1168502"/>
+        <a:ext cx="2011384" cy="2011323"/>
       </dsp:txXfrm>
     </dsp:sp>
     <dsp:sp modelId="{C4F84DEA-2002-4D32-8E80-70EEE05E345A}">
@@ -2033,7 +2012,7 @@
       </dsp:nvSpPr>
       <dsp:spPr>
         <a:xfrm>
-          <a:off x="2132933" y="569285"/>
+          <a:off x="2132933" y="565087"/>
           <a:ext cx="2011384" cy="603415"/>
         </a:xfrm>
         <a:prstGeom prst="rect">
@@ -2132,7 +2111,7 @@
         </a:p>
       </dsp:txBody>
       <dsp:txXfrm>
-        <a:off x="2132933" y="569285"/>
+        <a:off x="2132933" y="565087"/>
         <a:ext cx="2011384" cy="603415"/>
       </dsp:txXfrm>
     </dsp:sp>
@@ -2143,8 +2122,8 @@
       </dsp:nvSpPr>
       <dsp:spPr>
         <a:xfrm>
-          <a:off x="2132933" y="1172701"/>
-          <a:ext cx="2011384" cy="2002926"/>
+          <a:off x="2132933" y="1168502"/>
+          <a:ext cx="2011384" cy="2011323"/>
         </a:xfrm>
         <a:prstGeom prst="rect">
           <a:avLst/>
@@ -2221,13 +2200,13 @@
             <a:rPr lang="en-US" sz="1400" kern="1200" spc="50" baseline="0" dirty="0">
               <a:latin typeface="+mn-lt"/>
             </a:rPr>
-            <a:t> call analysis through mathematical tools.</a:t>
+            <a:t> call analysis through mathematical tools, Dataset target variable evaluation.</a:t>
           </a:r>
         </a:p>
       </dsp:txBody>
       <dsp:txXfrm>
-        <a:off x="2132933" y="1172701"/>
-        <a:ext cx="2011384" cy="2002926"/>
+        <a:off x="2132933" y="1168502"/>
+        <a:ext cx="2011384" cy="2011323"/>
       </dsp:txXfrm>
     </dsp:sp>
     <dsp:sp modelId="{49B7F8FA-D256-41EF-9327-52A3551D9A60}">
@@ -2237,7 +2216,7 @@
       </dsp:nvSpPr>
       <dsp:spPr>
         <a:xfrm>
-          <a:off x="4252107" y="569285"/>
+          <a:off x="4252107" y="565087"/>
           <a:ext cx="2011384" cy="603415"/>
         </a:xfrm>
         <a:prstGeom prst="rect">
@@ -2311,7 +2290,7 @@
         </a:p>
       </dsp:txBody>
       <dsp:txXfrm>
-        <a:off x="4252107" y="569285"/>
+        <a:off x="4252107" y="565087"/>
         <a:ext cx="2011384" cy="603415"/>
       </dsp:txXfrm>
     </dsp:sp>
@@ -2322,8 +2301,8 @@
       </dsp:nvSpPr>
       <dsp:spPr>
         <a:xfrm>
-          <a:off x="4252107" y="1172701"/>
-          <a:ext cx="2011384" cy="2002926"/>
+          <a:off x="4252107" y="1168502"/>
+          <a:ext cx="2011384" cy="2011323"/>
         </a:xfrm>
         <a:prstGeom prst="rect">
           <a:avLst/>
@@ -2497,8 +2476,8 @@
         </a:p>
       </dsp:txBody>
       <dsp:txXfrm>
-        <a:off x="4252107" y="1172701"/>
-        <a:ext cx="2011384" cy="2002926"/>
+        <a:off x="4252107" y="1168502"/>
+        <a:ext cx="2011384" cy="2011323"/>
       </dsp:txXfrm>
     </dsp:sp>
     <dsp:sp modelId="{4132ECB1-6BEF-4935-AFA3-B2EAA48FDE7E}">
@@ -2508,7 +2487,7 @@
       </dsp:nvSpPr>
       <dsp:spPr>
         <a:xfrm>
-          <a:off x="6371281" y="569285"/>
+          <a:off x="6371281" y="565087"/>
           <a:ext cx="2011384" cy="603415"/>
         </a:xfrm>
         <a:prstGeom prst="rect">
@@ -2582,7 +2561,7 @@
         </a:p>
       </dsp:txBody>
       <dsp:txXfrm>
-        <a:off x="6371281" y="569285"/>
+        <a:off x="6371281" y="565087"/>
         <a:ext cx="2011384" cy="603415"/>
       </dsp:txXfrm>
     </dsp:sp>
@@ -2593,8 +2572,8 @@
       </dsp:nvSpPr>
       <dsp:spPr>
         <a:xfrm>
-          <a:off x="6371281" y="1172701"/>
-          <a:ext cx="2011384" cy="2002926"/>
+          <a:off x="6371281" y="1168502"/>
+          <a:ext cx="2011384" cy="2011323"/>
         </a:xfrm>
         <a:prstGeom prst="rect">
           <a:avLst/>
@@ -2674,8 +2653,8 @@
         </a:p>
       </dsp:txBody>
       <dsp:txXfrm>
-        <a:off x="6371281" y="1172701"/>
-        <a:ext cx="2011384" cy="2002926"/>
+        <a:off x="6371281" y="1168502"/>
+        <a:ext cx="2011384" cy="2011323"/>
       </dsp:txXfrm>
     </dsp:sp>
     <dsp:sp modelId="{59606EB9-9F10-4D12-A33F-A242FDCC0D0F}">
@@ -2685,7 +2664,7 @@
       </dsp:nvSpPr>
       <dsp:spPr>
         <a:xfrm>
-          <a:off x="8490455" y="569285"/>
+          <a:off x="8490455" y="565087"/>
           <a:ext cx="2011384" cy="603415"/>
         </a:xfrm>
         <a:prstGeom prst="rect">
@@ -2759,7 +2738,7 @@
         </a:p>
       </dsp:txBody>
       <dsp:txXfrm>
-        <a:off x="8490455" y="569285"/>
+        <a:off x="8490455" y="565087"/>
         <a:ext cx="2011384" cy="603415"/>
       </dsp:txXfrm>
     </dsp:sp>
@@ -2770,8 +2749,8 @@
       </dsp:nvSpPr>
       <dsp:spPr>
         <a:xfrm>
-          <a:off x="8490455" y="1172701"/>
-          <a:ext cx="2011384" cy="2002926"/>
+          <a:off x="8490455" y="1168502"/>
+          <a:ext cx="2011384" cy="2011323"/>
         </a:xfrm>
         <a:prstGeom prst="rect">
           <a:avLst/>
@@ -2883,8 +2862,8 @@
         </a:p>
       </dsp:txBody>
       <dsp:txXfrm>
-        <a:off x="8490455" y="1172701"/>
-        <a:ext cx="2011384" cy="2002926"/>
+        <a:off x="8490455" y="1168502"/>
+        <a:ext cx="2011384" cy="2011323"/>
       </dsp:txXfrm>
     </dsp:sp>
   </dsp:spTree>
@@ -4186,7 +4165,7 @@
           <a:p>
             <a:fld id="{B56F32FC-4BD9-442A-A8C6-51598C909FE3}" type="datetimeFigureOut">
               <a:rPr lang="en-US" smtClean="0"/>
-              <a:t>4/13/2023</a:t>
+              <a:t>5/23/2023</a:t>
             </a:fld>
             <a:endParaRPr lang="en-US" dirty="0"/>
           </a:p>
@@ -4363,7 +4342,7 @@
           <a:p>
             <a:fld id="{056371FA-A98D-41E8-93F4-09945841298A}" type="datetimeFigureOut">
               <a:rPr lang="en-US" smtClean="0"/>
-              <a:t>4/13/2023</a:t>
+              <a:t>5/23/2023</a:t>
             </a:fld>
             <a:endParaRPr lang="en-US" dirty="0"/>
           </a:p>
@@ -13533,7 +13512,7 @@
           <a:p>
             <a:r>
               <a:rPr lang="en-US" dirty="0"/>
-              <a:t>Shashank Sharma</a:t>
+              <a:t>Shashank G. Sharma</a:t>
             </a:r>
           </a:p>
           <a:p>
@@ -13883,7 +13862,7 @@
             </a:r>
             <a:r>
               <a:rPr lang="en-US" dirty="0" err="1"/>
-              <a:t>tensorflow</a:t>
+              <a:t>Tensorflow</a:t>
             </a:r>
             <a:r>
               <a:rPr lang="en-US" dirty="0"/>
@@ -14257,7 +14236,7 @@
           <a:p>
             <a:r>
               <a:rPr lang="en-US" sz="3600" dirty="0"/>
-              <a:t>POST-MEETING WORK</a:t>
+              <a:t>TIMELINE</a:t>
             </a:r>
           </a:p>
         </p:txBody>
@@ -14297,7 +14276,7 @@
           <p:cNvPr id="2" name="Title 1">
             <a:extLst>
               <a:ext uri="{FF2B5EF4-FFF2-40B4-BE49-F238E27FC236}">
-                <a16:creationId xmlns:a16="http://schemas.microsoft.com/office/drawing/2014/main" id="{4F6A2D15-4D68-4BF7-9421-032AE6C8852C}"/>
+                <a16:creationId xmlns:a16="http://schemas.microsoft.com/office/drawing/2014/main" id="{FA93DB88-62DD-4C41-977F-D59BEF14EE76}"/>
               </a:ext>
             </a:extLst>
           </p:cNvPr>
@@ -14310,8 +14289,8 @@
         </p:nvSpPr>
         <p:spPr>
           <a:xfrm>
-            <a:off x="1885156" y="892177"/>
-            <a:ext cx="8421688" cy="1325563"/>
+            <a:off x="838200" y="5509419"/>
+            <a:ext cx="4082142" cy="585788"/>
           </a:xfrm>
         </p:spPr>
         <p:txBody>
@@ -14320,7 +14299,7 @@
           <a:p>
             <a:r>
               <a:rPr lang="en-US" dirty="0"/>
-              <a:t>MEET OUR TEAM</a:t>
+              <a:t>TIMELINE</a:t>
             </a:r>
           </a:p>
         </p:txBody>
@@ -14330,21 +14309,56 @@
           <p:cNvPr id="3" name="Text Placeholder 2">
             <a:extLst>
               <a:ext uri="{FF2B5EF4-FFF2-40B4-BE49-F238E27FC236}">
-                <a16:creationId xmlns:a16="http://schemas.microsoft.com/office/drawing/2014/main" id="{78BCC184-1096-457B-AB72-BD49E6E54117}"/>
-              </a:ext>
-            </a:extLst>
-          </p:cNvPr>
-          <p:cNvSpPr>
-            <a:spLocks noGrp="1"/>
-          </p:cNvSpPr>
-          <p:nvPr>
-            <p:ph type="body" idx="1"/>
-          </p:nvPr>
-        </p:nvSpPr>
-        <p:spPr>
-          <a:xfrm>
-            <a:off x="1228568" y="5084524"/>
-            <a:ext cx="2317707" cy="737333"/>
+                <a16:creationId xmlns:a16="http://schemas.microsoft.com/office/drawing/2014/main" id="{AEF37E83-2D8B-42EF-A2C4-5D2BBDB1F05B}"/>
+              </a:ext>
+            </a:extLst>
+          </p:cNvPr>
+          <p:cNvSpPr>
+            <a:spLocks noGrp="1"/>
+          </p:cNvSpPr>
+          <p:nvPr>
+            <p:ph type="body" sz="quarter" idx="13"/>
+          </p:nvPr>
+        </p:nvSpPr>
+        <p:spPr>
+          <a:xfrm>
+            <a:off x="166074" y="1507772"/>
+            <a:ext cx="2141764" cy="514350"/>
+          </a:xfrm>
+        </p:spPr>
+        <p:txBody>
+          <a:bodyPr>
+            <a:normAutofit/>
+          </a:bodyPr>
+          <a:lstStyle/>
+          <a:p>
+            <a:r>
+              <a:rPr lang="en-US" dirty="0"/>
+              <a:t>W13</a:t>
+            </a:r>
+          </a:p>
+        </p:txBody>
+      </p:sp>
+      <p:sp>
+        <p:nvSpPr>
+          <p:cNvPr id="4" name="Text Placeholder 3">
+            <a:extLst>
+              <a:ext uri="{FF2B5EF4-FFF2-40B4-BE49-F238E27FC236}">
+                <a16:creationId xmlns:a16="http://schemas.microsoft.com/office/drawing/2014/main" id="{B0D77839-2CFD-4BC8-85DA-9EE69CCE1B20}"/>
+              </a:ext>
+            </a:extLst>
+          </p:cNvPr>
+          <p:cNvSpPr>
+            <a:spLocks noGrp="1"/>
+          </p:cNvSpPr>
+          <p:nvPr>
+            <p:ph type="body" sz="quarter" idx="14"/>
+          </p:nvPr>
+        </p:nvSpPr>
+        <p:spPr>
+          <a:xfrm>
+            <a:off x="732131" y="2584097"/>
+            <a:ext cx="2141764" cy="514350"/>
           </a:xfrm>
         </p:spPr>
         <p:txBody>
@@ -14353,23 +14367,257 @@
           <a:p>
             <a:r>
               <a:rPr lang="en-US" dirty="0"/>
-              <a:t>SHASHANK SHARMA</a:t>
-            </a:r>
-          </a:p>
-          <a:p>
-            <a:r>
-              <a:rPr lang="en-US" sz="1200" dirty="0"/>
-              <a:t>191310132134</a:t>
-            </a:r>
-          </a:p>
-        </p:txBody>
-      </p:sp>
-      <p:sp>
-        <p:nvSpPr>
-          <p:cNvPr id="23" name="Date Placeholder 22">
-            <a:extLst>
-              <a:ext uri="{FF2B5EF4-FFF2-40B4-BE49-F238E27FC236}">
-                <a16:creationId xmlns:a16="http://schemas.microsoft.com/office/drawing/2014/main" id="{637DEDF5-3FCD-4BC2-86A5-7BE2BF01EA38}"/>
+              <a:t>W14</a:t>
+            </a:r>
+          </a:p>
+        </p:txBody>
+      </p:sp>
+      <p:sp>
+        <p:nvSpPr>
+          <p:cNvPr id="5" name="Text Placeholder 4">
+            <a:extLst>
+              <a:ext uri="{FF2B5EF4-FFF2-40B4-BE49-F238E27FC236}">
+                <a16:creationId xmlns:a16="http://schemas.microsoft.com/office/drawing/2014/main" id="{57E386FF-C90F-4484-A843-D4BA75FFF002}"/>
+              </a:ext>
+            </a:extLst>
+          </p:cNvPr>
+          <p:cNvSpPr>
+            <a:spLocks noGrp="1"/>
+          </p:cNvSpPr>
+          <p:nvPr>
+            <p:ph type="body" sz="quarter" idx="15"/>
+          </p:nvPr>
+        </p:nvSpPr>
+        <p:spPr>
+          <a:xfrm>
+            <a:off x="1338556" y="3660422"/>
+            <a:ext cx="2141764" cy="514350"/>
+          </a:xfrm>
+        </p:spPr>
+        <p:txBody>
+          <a:bodyPr/>
+          <a:lstStyle/>
+          <a:p>
+            <a:r>
+              <a:rPr lang="en-US" dirty="0"/>
+              <a:t>W15</a:t>
+            </a:r>
+          </a:p>
+        </p:txBody>
+      </p:sp>
+      <p:sp>
+        <p:nvSpPr>
+          <p:cNvPr id="6" name="Text Placeholder 5">
+            <a:extLst>
+              <a:ext uri="{FF2B5EF4-FFF2-40B4-BE49-F238E27FC236}">
+                <a16:creationId xmlns:a16="http://schemas.microsoft.com/office/drawing/2014/main" id="{F30780D1-5C1B-411C-81ED-7B9970FCBF8A}"/>
+              </a:ext>
+            </a:extLst>
+          </p:cNvPr>
+          <p:cNvSpPr>
+            <a:spLocks noGrp="1"/>
+          </p:cNvSpPr>
+          <p:nvPr>
+            <p:ph type="body" sz="quarter" idx="16"/>
+          </p:nvPr>
+        </p:nvSpPr>
+        <p:spPr>
+          <a:xfrm>
+            <a:off x="1922756" y="4736748"/>
+            <a:ext cx="2141764" cy="514350"/>
+          </a:xfrm>
+        </p:spPr>
+        <p:txBody>
+          <a:bodyPr/>
+          <a:lstStyle/>
+          <a:p>
+            <a:r>
+              <a:rPr lang="en-US" dirty="0"/>
+              <a:t>W16</a:t>
+            </a:r>
+          </a:p>
+        </p:txBody>
+      </p:sp>
+      <p:sp>
+        <p:nvSpPr>
+          <p:cNvPr id="12" name="Text Placeholder 11">
+            <a:extLst>
+              <a:ext uri="{FF2B5EF4-FFF2-40B4-BE49-F238E27FC236}">
+                <a16:creationId xmlns:a16="http://schemas.microsoft.com/office/drawing/2014/main" id="{FABE7D8B-D1CD-44C0-AD2D-2ABA67684E97}"/>
+              </a:ext>
+            </a:extLst>
+          </p:cNvPr>
+          <p:cNvSpPr>
+            <a:spLocks noGrp="1"/>
+          </p:cNvSpPr>
+          <p:nvPr>
+            <p:ph type="body" sz="quarter" idx="17"/>
+          </p:nvPr>
+        </p:nvSpPr>
+        <p:spPr>
+          <a:xfrm>
+            <a:off x="4401535" y="1613528"/>
+            <a:ext cx="5540323" cy="995201"/>
+          </a:xfrm>
+        </p:spPr>
+        <p:txBody>
+          <a:bodyPr>
+            <a:normAutofit/>
+          </a:bodyPr>
+          <a:lstStyle/>
+          <a:p>
+            <a:pPr>
+              <a:lnSpc>
+                <a:spcPct val="110000"/>
+              </a:lnSpc>
+            </a:pPr>
+            <a:r>
+              <a:rPr lang="en-US" dirty="0"/>
+              <a:t>Improvisations and Optimizations: </a:t>
+            </a:r>
+          </a:p>
+          <a:p>
+            <a:pPr>
+              <a:lnSpc>
+                <a:spcPct val="110000"/>
+              </a:lnSpc>
+            </a:pPr>
+            <a:r>
+              <a:rPr lang="en-US" dirty="0"/>
+              <a:t>Stratified K-fold CV, SMOTE resampling.</a:t>
+            </a:r>
+          </a:p>
+        </p:txBody>
+      </p:sp>
+      <p:sp>
+        <p:nvSpPr>
+          <p:cNvPr id="13" name="Text Placeholder 12">
+            <a:extLst>
+              <a:ext uri="{FF2B5EF4-FFF2-40B4-BE49-F238E27FC236}">
+                <a16:creationId xmlns:a16="http://schemas.microsoft.com/office/drawing/2014/main" id="{8C2F0B15-120C-423F-8EE5-F303B19D5CC5}"/>
+              </a:ext>
+            </a:extLst>
+          </p:cNvPr>
+          <p:cNvSpPr>
+            <a:spLocks noGrp="1"/>
+          </p:cNvSpPr>
+          <p:nvPr>
+            <p:ph type="body" sz="quarter" idx="18"/>
+          </p:nvPr>
+        </p:nvSpPr>
+        <p:spPr>
+          <a:xfrm>
+            <a:off x="4986029" y="2682564"/>
+            <a:ext cx="5102680" cy="1010842"/>
+          </a:xfrm>
+        </p:spPr>
+        <p:txBody>
+          <a:bodyPr>
+            <a:normAutofit/>
+          </a:bodyPr>
+          <a:lstStyle/>
+          <a:p>
+            <a:r>
+              <a:rPr lang="en-US" dirty="0"/>
+              <a:t>Improvisations and Optimizations: </a:t>
+            </a:r>
+          </a:p>
+          <a:p>
+            <a:r>
+              <a:rPr lang="en-US" dirty="0"/>
+              <a:t>Hyperparameter Optimization using GridSearchCV, Evaluation of CV and Test results.</a:t>
+            </a:r>
+          </a:p>
+        </p:txBody>
+      </p:sp>
+      <p:sp>
+        <p:nvSpPr>
+          <p:cNvPr id="14" name="Text Placeholder 13">
+            <a:extLst>
+              <a:ext uri="{FF2B5EF4-FFF2-40B4-BE49-F238E27FC236}">
+                <a16:creationId xmlns:a16="http://schemas.microsoft.com/office/drawing/2014/main" id="{300D2644-F516-41F1-A88D-93673EA209A4}"/>
+              </a:ext>
+            </a:extLst>
+          </p:cNvPr>
+          <p:cNvSpPr>
+            <a:spLocks noGrp="1"/>
+          </p:cNvSpPr>
+          <p:nvPr>
+            <p:ph type="body" sz="quarter" idx="19"/>
+          </p:nvPr>
+        </p:nvSpPr>
+        <p:spPr>
+          <a:xfrm>
+            <a:off x="5576938" y="3755394"/>
+            <a:ext cx="5102680" cy="1010842"/>
+          </a:xfrm>
+        </p:spPr>
+        <p:txBody>
+          <a:bodyPr>
+            <a:normAutofit/>
+          </a:bodyPr>
+          <a:lstStyle/>
+          <a:p>
+            <a:r>
+              <a:rPr lang="en-US" dirty="0"/>
+              <a:t>Report Formation: </a:t>
+            </a:r>
+          </a:p>
+          <a:p>
+            <a:r>
+              <a:rPr lang="en-US" dirty="0"/>
+              <a:t>Intro, Abstract, System Analysis, System Design, Implementation. </a:t>
+            </a:r>
+          </a:p>
+        </p:txBody>
+      </p:sp>
+      <p:sp>
+        <p:nvSpPr>
+          <p:cNvPr id="15" name="Text Placeholder 14">
+            <a:extLst>
+              <a:ext uri="{FF2B5EF4-FFF2-40B4-BE49-F238E27FC236}">
+                <a16:creationId xmlns:a16="http://schemas.microsoft.com/office/drawing/2014/main" id="{9405A1F0-98C1-4B11-8D9A-3C009ADC44D0}"/>
+              </a:ext>
+            </a:extLst>
+          </p:cNvPr>
+          <p:cNvSpPr>
+            <a:spLocks noGrp="1"/>
+          </p:cNvSpPr>
+          <p:nvPr>
+            <p:ph type="body" sz="quarter" idx="20"/>
+          </p:nvPr>
+        </p:nvSpPr>
+        <p:spPr>
+          <a:xfrm>
+            <a:off x="6175280" y="4824430"/>
+            <a:ext cx="5102680" cy="1010842"/>
+          </a:xfrm>
+        </p:spPr>
+        <p:txBody>
+          <a:bodyPr>
+            <a:normAutofit/>
+          </a:bodyPr>
+          <a:lstStyle/>
+          <a:p>
+            <a:r>
+              <a:rPr lang="en-US" dirty="0"/>
+              <a:t>Report Formation:</a:t>
+            </a:r>
+          </a:p>
+          <a:p>
+            <a:r>
+              <a:rPr lang="en-US" dirty="0"/>
+              <a:t>Testing, Limitations and Future Enhancements, Conclusion and Reference, Plagiarism Report.</a:t>
+            </a:r>
+          </a:p>
+        </p:txBody>
+      </p:sp>
+      <p:sp>
+        <p:nvSpPr>
+          <p:cNvPr id="16" name="Date Placeholder 15">
+            <a:extLst>
+              <a:ext uri="{FF2B5EF4-FFF2-40B4-BE49-F238E27FC236}">
+                <a16:creationId xmlns:a16="http://schemas.microsoft.com/office/drawing/2014/main" id="{24238BD7-9B10-4E64-B1B4-FDE6DD70AA60}"/>
               </a:ext>
             </a:extLst>
           </p:cNvPr>
@@ -14399,10 +14647,10 @@
       </p:sp>
       <p:sp>
         <p:nvSpPr>
-          <p:cNvPr id="24" name="Footer Placeholder 23">
-            <a:extLst>
-              <a:ext uri="{FF2B5EF4-FFF2-40B4-BE49-F238E27FC236}">
-                <a16:creationId xmlns:a16="http://schemas.microsoft.com/office/drawing/2014/main" id="{918C3C97-444D-4600-8553-B9C4C1F8483B}"/>
+          <p:cNvPr id="17" name="Footer Placeholder 16">
+            <a:extLst>
+              <a:ext uri="{FF2B5EF4-FFF2-40B4-BE49-F238E27FC236}">
+                <a16:creationId xmlns:a16="http://schemas.microsoft.com/office/drawing/2014/main" id="{CD3D67B7-A821-49FC-94BE-19EDE9D319A5}"/>
               </a:ext>
             </a:extLst>
           </p:cNvPr>
@@ -14415,8 +14663,8 @@
         </p:nvSpPr>
         <p:spPr>
           <a:xfrm>
-            <a:off x="4038600" y="6356350"/>
-            <a:ext cx="4114800" cy="365125"/>
+            <a:off x="6749143" y="6356350"/>
+            <a:ext cx="3775981" cy="365125"/>
           </a:xfrm>
         </p:spPr>
         <p:txBody>
@@ -14432,10 +14680,10 @@
       </p:sp>
       <p:sp>
         <p:nvSpPr>
-          <p:cNvPr id="25" name="Slide Number Placeholder 24">
-            <a:extLst>
-              <a:ext uri="{FF2B5EF4-FFF2-40B4-BE49-F238E27FC236}">
-                <a16:creationId xmlns:a16="http://schemas.microsoft.com/office/drawing/2014/main" id="{148E9129-4CC6-47BA-ACD8-2C632A8660EC}"/>
+          <p:cNvPr id="18" name="Slide Number Placeholder 17">
+            <a:extLst>
+              <a:ext uri="{FF2B5EF4-FFF2-40B4-BE49-F238E27FC236}">
+                <a16:creationId xmlns:a16="http://schemas.microsoft.com/office/drawing/2014/main" id="{C8D6D0E8-3983-4B7D-ADB2-077E17AD3BD0}"/>
               </a:ext>
             </a:extLst>
           </p:cNvPr>
@@ -14448,8 +14696,8 @@
         </p:nvSpPr>
         <p:spPr>
           <a:xfrm>
-            <a:off x="8610600" y="6356350"/>
-            <a:ext cx="2743200" cy="365125"/>
+            <a:off x="10810874" y="6356350"/>
+            <a:ext cx="542925" cy="365125"/>
           </a:xfrm>
         </p:spPr>
         <p:txBody>
@@ -14467,735 +14715,183 @@
       </p:sp>
       <p:sp>
         <p:nvSpPr>
-          <p:cNvPr id="30" name="Text Placeholder 2">
-            <a:extLst>
-              <a:ext uri="{FF2B5EF4-FFF2-40B4-BE49-F238E27FC236}">
-                <a16:creationId xmlns:a16="http://schemas.microsoft.com/office/drawing/2014/main" id="{2B08B27E-2A72-5005-B775-C90B8F76DB05}"/>
-              </a:ext>
-            </a:extLst>
-          </p:cNvPr>
-          <p:cNvSpPr txBox="1">
-            <a:spLocks/>
-          </p:cNvSpPr>
+          <p:cNvPr id="7" name="TextBox 6">
+            <a:extLst>
+              <a:ext uri="{FF2B5EF4-FFF2-40B4-BE49-F238E27FC236}">
+                <a16:creationId xmlns:a16="http://schemas.microsoft.com/office/drawing/2014/main" id="{2D483B48-D226-5EB4-8C58-AE90EC35F0D8}"/>
+              </a:ext>
+            </a:extLst>
+          </p:cNvPr>
+          <p:cNvSpPr txBox="1"/>
           <p:nvPr/>
         </p:nvSpPr>
         <p:spPr>
           <a:xfrm>
-            <a:off x="3666968" y="5084524"/>
-            <a:ext cx="2317707" cy="737333"/>
+            <a:off x="1241834" y="1833015"/>
+            <a:ext cx="1722391" cy="369332"/>
           </a:xfrm>
           <a:prstGeom prst="rect">
             <a:avLst/>
           </a:prstGeom>
-        </p:spPr>
-        <p:txBody>
-          <a:bodyPr vert="horz" lIns="91440" tIns="45720" rIns="91440" bIns="45720" rtlCol="0" anchor="ctr">
-            <a:noAutofit/>
+          <a:noFill/>
+        </p:spPr>
+        <p:txBody>
+          <a:bodyPr wrap="square" rtlCol="0">
+            <a:spAutoFit/>
           </a:bodyPr>
-          <a:lstStyle>
-            <a:lvl1pPr marL="0" indent="0" algn="ctr" defTabSz="914400" rtl="0" eaLnBrk="1" latinLnBrk="0" hangingPunct="1">
-              <a:lnSpc>
-                <a:spcPct val="90000"/>
-              </a:lnSpc>
-              <a:spcBef>
-                <a:spcPts val="1000"/>
-              </a:spcBef>
-              <a:buFont typeface="Arial" panose="020B0604020202020204" pitchFamily="34" charset="0"/>
-              <a:buNone/>
-              <a:defRPr lang="en-US" sz="1400" kern="1200" spc="150" baseline="0" dirty="0" smtClean="0">
-                <a:solidFill>
-                  <a:schemeClr val="tx1"/>
-                </a:solidFill>
-                <a:latin typeface="+mj-lt"/>
-                <a:ea typeface="+mj-ea"/>
-                <a:cs typeface="+mj-cs"/>
-              </a:defRPr>
-            </a:lvl1pPr>
-            <a:lvl2pPr marL="457200" indent="0" algn="l" defTabSz="914400" rtl="0" eaLnBrk="1" latinLnBrk="0" hangingPunct="1">
-              <a:lnSpc>
-                <a:spcPct val="90000"/>
-              </a:lnSpc>
-              <a:spcBef>
-                <a:spcPts val="500"/>
-              </a:spcBef>
-              <a:buFont typeface="Arial" panose="020B0604020202020204" pitchFamily="34" charset="0"/>
-              <a:buNone/>
-              <a:defRPr sz="2000" b="1" kern="1200">
-                <a:solidFill>
-                  <a:schemeClr val="tx1"/>
-                </a:solidFill>
-                <a:latin typeface="+mn-lt"/>
-                <a:ea typeface="+mn-ea"/>
-                <a:cs typeface="+mn-cs"/>
-              </a:defRPr>
-            </a:lvl2pPr>
-            <a:lvl3pPr marL="914400" indent="0" algn="l" defTabSz="914400" rtl="0" eaLnBrk="1" latinLnBrk="0" hangingPunct="1">
-              <a:lnSpc>
-                <a:spcPct val="90000"/>
-              </a:lnSpc>
-              <a:spcBef>
-                <a:spcPts val="500"/>
-              </a:spcBef>
-              <a:buFont typeface="Arial" panose="020B0604020202020204" pitchFamily="34" charset="0"/>
-              <a:buNone/>
-              <a:defRPr sz="1800" b="1" kern="1200">
-                <a:solidFill>
-                  <a:schemeClr val="tx1"/>
-                </a:solidFill>
-                <a:latin typeface="+mn-lt"/>
-                <a:ea typeface="+mn-ea"/>
-                <a:cs typeface="+mn-cs"/>
-              </a:defRPr>
-            </a:lvl3pPr>
-            <a:lvl4pPr marL="1371600" indent="0" algn="l" defTabSz="914400" rtl="0" eaLnBrk="1" latinLnBrk="0" hangingPunct="1">
-              <a:lnSpc>
-                <a:spcPct val="90000"/>
-              </a:lnSpc>
-              <a:spcBef>
-                <a:spcPts val="500"/>
-              </a:spcBef>
-              <a:buFont typeface="Arial" panose="020B0604020202020204" pitchFamily="34" charset="0"/>
-              <a:buNone/>
-              <a:defRPr sz="1600" b="1" kern="1200">
-                <a:solidFill>
-                  <a:schemeClr val="tx1"/>
-                </a:solidFill>
-                <a:latin typeface="+mn-lt"/>
-                <a:ea typeface="+mn-ea"/>
-                <a:cs typeface="+mn-cs"/>
-              </a:defRPr>
-            </a:lvl4pPr>
-            <a:lvl5pPr marL="1828800" indent="0" algn="l" defTabSz="914400" rtl="0" eaLnBrk="1" latinLnBrk="0" hangingPunct="1">
-              <a:lnSpc>
-                <a:spcPct val="90000"/>
-              </a:lnSpc>
-              <a:spcBef>
-                <a:spcPts val="500"/>
-              </a:spcBef>
-              <a:buFont typeface="Arial" panose="020B0604020202020204" pitchFamily="34" charset="0"/>
-              <a:buNone/>
-              <a:defRPr sz="1600" b="1" kern="1200">
-                <a:solidFill>
-                  <a:schemeClr val="tx1"/>
-                </a:solidFill>
-                <a:latin typeface="+mn-lt"/>
-                <a:ea typeface="+mn-ea"/>
-                <a:cs typeface="+mn-cs"/>
-              </a:defRPr>
-            </a:lvl5pPr>
-            <a:lvl6pPr marL="2286000" indent="0" algn="l" defTabSz="914400" rtl="0" eaLnBrk="1" latinLnBrk="0" hangingPunct="1">
-              <a:lnSpc>
-                <a:spcPct val="90000"/>
-              </a:lnSpc>
-              <a:spcBef>
-                <a:spcPts val="500"/>
-              </a:spcBef>
-              <a:buFont typeface="Arial" panose="020B0604020202020204" pitchFamily="34" charset="0"/>
-              <a:buNone/>
-              <a:defRPr sz="1600" b="1" kern="1200">
-                <a:solidFill>
-                  <a:schemeClr val="tx1"/>
-                </a:solidFill>
-                <a:latin typeface="+mn-lt"/>
-                <a:ea typeface="+mn-ea"/>
-                <a:cs typeface="+mn-cs"/>
-              </a:defRPr>
-            </a:lvl6pPr>
-            <a:lvl7pPr marL="2743200" indent="0" algn="l" defTabSz="914400" rtl="0" eaLnBrk="1" latinLnBrk="0" hangingPunct="1">
-              <a:lnSpc>
-                <a:spcPct val="90000"/>
-              </a:lnSpc>
-              <a:spcBef>
-                <a:spcPts val="500"/>
-              </a:spcBef>
-              <a:buFont typeface="Arial" panose="020B0604020202020204" pitchFamily="34" charset="0"/>
-              <a:buNone/>
-              <a:defRPr sz="1600" b="1" kern="1200">
-                <a:solidFill>
-                  <a:schemeClr val="tx1"/>
-                </a:solidFill>
-                <a:latin typeface="+mn-lt"/>
-                <a:ea typeface="+mn-ea"/>
-                <a:cs typeface="+mn-cs"/>
-              </a:defRPr>
-            </a:lvl7pPr>
-            <a:lvl8pPr marL="3200400" indent="0" algn="l" defTabSz="914400" rtl="0" eaLnBrk="1" latinLnBrk="0" hangingPunct="1">
-              <a:lnSpc>
-                <a:spcPct val="90000"/>
-              </a:lnSpc>
-              <a:spcBef>
-                <a:spcPts val="500"/>
-              </a:spcBef>
-              <a:buFont typeface="Arial" panose="020B0604020202020204" pitchFamily="34" charset="0"/>
-              <a:buNone/>
-              <a:defRPr sz="1600" b="1" kern="1200">
-                <a:solidFill>
-                  <a:schemeClr val="tx1"/>
-                </a:solidFill>
-                <a:latin typeface="+mn-lt"/>
-                <a:ea typeface="+mn-ea"/>
-                <a:cs typeface="+mn-cs"/>
-              </a:defRPr>
-            </a:lvl8pPr>
-            <a:lvl9pPr marL="3657600" indent="0" algn="l" defTabSz="914400" rtl="0" eaLnBrk="1" latinLnBrk="0" hangingPunct="1">
-              <a:lnSpc>
-                <a:spcPct val="90000"/>
-              </a:lnSpc>
-              <a:spcBef>
-                <a:spcPts val="500"/>
-              </a:spcBef>
-              <a:buFont typeface="Arial" panose="020B0604020202020204" pitchFamily="34" charset="0"/>
-              <a:buNone/>
-              <a:defRPr sz="1600" b="1" kern="1200">
-                <a:solidFill>
-                  <a:schemeClr val="tx1"/>
-                </a:solidFill>
-                <a:latin typeface="+mn-lt"/>
-                <a:ea typeface="+mn-ea"/>
-                <a:cs typeface="+mn-cs"/>
-              </a:defRPr>
-            </a:lvl9pPr>
-          </a:lstStyle>
+          <a:lstStyle/>
           <a:p>
             <a:r>
               <a:rPr lang="en-US" dirty="0"/>
-              <a:t>PRATHAM PATEL</a:t>
-            </a:r>
-          </a:p>
-          <a:p>
-            <a:r>
-              <a:rPr lang="en-US" sz="1200" dirty="0"/>
-              <a:t>191310132103</a:t>
-            </a:r>
-          </a:p>
-        </p:txBody>
-      </p:sp>
-      <p:sp>
-        <p:nvSpPr>
-          <p:cNvPr id="31" name="Text Placeholder 2">
-            <a:extLst>
-              <a:ext uri="{FF2B5EF4-FFF2-40B4-BE49-F238E27FC236}">
-                <a16:creationId xmlns:a16="http://schemas.microsoft.com/office/drawing/2014/main" id="{5066B11B-34FC-3E43-2799-B2E76C6199F2}"/>
-              </a:ext>
-            </a:extLst>
-          </p:cNvPr>
-          <p:cNvSpPr txBox="1">
-            <a:spLocks/>
-          </p:cNvSpPr>
+              <a:t>(17/04 – 23/04)</a:t>
+            </a:r>
+          </a:p>
+        </p:txBody>
+      </p:sp>
+      <p:sp>
+        <p:nvSpPr>
+          <p:cNvPr id="8" name="TextBox 7">
+            <a:extLst>
+              <a:ext uri="{FF2B5EF4-FFF2-40B4-BE49-F238E27FC236}">
+                <a16:creationId xmlns:a16="http://schemas.microsoft.com/office/drawing/2014/main" id="{3E20FECE-5FE9-5FFD-618F-77924117F266}"/>
+              </a:ext>
+            </a:extLst>
+          </p:cNvPr>
+          <p:cNvSpPr txBox="1"/>
           <p:nvPr/>
         </p:nvSpPr>
         <p:spPr>
           <a:xfrm>
-            <a:off x="6105368" y="5084523"/>
-            <a:ext cx="2317707" cy="737333"/>
+            <a:off x="1802188" y="2858276"/>
+            <a:ext cx="1722391" cy="369332"/>
           </a:xfrm>
           <a:prstGeom prst="rect">
             <a:avLst/>
           </a:prstGeom>
-        </p:spPr>
-        <p:txBody>
-          <a:bodyPr vert="horz" lIns="91440" tIns="45720" rIns="91440" bIns="45720" rtlCol="0" anchor="ctr">
-            <a:noAutofit/>
+          <a:noFill/>
+        </p:spPr>
+        <p:txBody>
+          <a:bodyPr wrap="square" rtlCol="0">
+            <a:spAutoFit/>
           </a:bodyPr>
-          <a:lstStyle>
-            <a:lvl1pPr marL="0" indent="0" algn="ctr" defTabSz="914400" rtl="0" eaLnBrk="1" latinLnBrk="0" hangingPunct="1">
-              <a:lnSpc>
-                <a:spcPct val="90000"/>
-              </a:lnSpc>
-              <a:spcBef>
-                <a:spcPts val="1000"/>
-              </a:spcBef>
-              <a:buFont typeface="Arial" panose="020B0604020202020204" pitchFamily="34" charset="0"/>
-              <a:buNone/>
-              <a:defRPr lang="en-US" sz="1400" kern="1200" spc="150" baseline="0" dirty="0" smtClean="0">
-                <a:solidFill>
-                  <a:schemeClr val="tx1"/>
-                </a:solidFill>
-                <a:latin typeface="+mj-lt"/>
-                <a:ea typeface="+mj-ea"/>
-                <a:cs typeface="+mj-cs"/>
-              </a:defRPr>
-            </a:lvl1pPr>
-            <a:lvl2pPr marL="457200" indent="0" algn="l" defTabSz="914400" rtl="0" eaLnBrk="1" latinLnBrk="0" hangingPunct="1">
-              <a:lnSpc>
-                <a:spcPct val="90000"/>
-              </a:lnSpc>
-              <a:spcBef>
-                <a:spcPts val="500"/>
-              </a:spcBef>
-              <a:buFont typeface="Arial" panose="020B0604020202020204" pitchFamily="34" charset="0"/>
-              <a:buNone/>
-              <a:defRPr sz="2000" b="1" kern="1200">
-                <a:solidFill>
-                  <a:schemeClr val="tx1"/>
-                </a:solidFill>
-                <a:latin typeface="+mn-lt"/>
-                <a:ea typeface="+mn-ea"/>
-                <a:cs typeface="+mn-cs"/>
-              </a:defRPr>
-            </a:lvl2pPr>
-            <a:lvl3pPr marL="914400" indent="0" algn="l" defTabSz="914400" rtl="0" eaLnBrk="1" latinLnBrk="0" hangingPunct="1">
-              <a:lnSpc>
-                <a:spcPct val="90000"/>
-              </a:lnSpc>
-              <a:spcBef>
-                <a:spcPts val="500"/>
-              </a:spcBef>
-              <a:buFont typeface="Arial" panose="020B0604020202020204" pitchFamily="34" charset="0"/>
-              <a:buNone/>
-              <a:defRPr sz="1800" b="1" kern="1200">
-                <a:solidFill>
-                  <a:schemeClr val="tx1"/>
-                </a:solidFill>
-                <a:latin typeface="+mn-lt"/>
-                <a:ea typeface="+mn-ea"/>
-                <a:cs typeface="+mn-cs"/>
-              </a:defRPr>
-            </a:lvl3pPr>
-            <a:lvl4pPr marL="1371600" indent="0" algn="l" defTabSz="914400" rtl="0" eaLnBrk="1" latinLnBrk="0" hangingPunct="1">
-              <a:lnSpc>
-                <a:spcPct val="90000"/>
-              </a:lnSpc>
-              <a:spcBef>
-                <a:spcPts val="500"/>
-              </a:spcBef>
-              <a:buFont typeface="Arial" panose="020B0604020202020204" pitchFamily="34" charset="0"/>
-              <a:buNone/>
-              <a:defRPr sz="1600" b="1" kern="1200">
-                <a:solidFill>
-                  <a:schemeClr val="tx1"/>
-                </a:solidFill>
-                <a:latin typeface="+mn-lt"/>
-                <a:ea typeface="+mn-ea"/>
-                <a:cs typeface="+mn-cs"/>
-              </a:defRPr>
-            </a:lvl4pPr>
-            <a:lvl5pPr marL="1828800" indent="0" algn="l" defTabSz="914400" rtl="0" eaLnBrk="1" latinLnBrk="0" hangingPunct="1">
-              <a:lnSpc>
-                <a:spcPct val="90000"/>
-              </a:lnSpc>
-              <a:spcBef>
-                <a:spcPts val="500"/>
-              </a:spcBef>
-              <a:buFont typeface="Arial" panose="020B0604020202020204" pitchFamily="34" charset="0"/>
-              <a:buNone/>
-              <a:defRPr sz="1600" b="1" kern="1200">
-                <a:solidFill>
-                  <a:schemeClr val="tx1"/>
-                </a:solidFill>
-                <a:latin typeface="+mn-lt"/>
-                <a:ea typeface="+mn-ea"/>
-                <a:cs typeface="+mn-cs"/>
-              </a:defRPr>
-            </a:lvl5pPr>
-            <a:lvl6pPr marL="2286000" indent="0" algn="l" defTabSz="914400" rtl="0" eaLnBrk="1" latinLnBrk="0" hangingPunct="1">
-              <a:lnSpc>
-                <a:spcPct val="90000"/>
-              </a:lnSpc>
-              <a:spcBef>
-                <a:spcPts val="500"/>
-              </a:spcBef>
-              <a:buFont typeface="Arial" panose="020B0604020202020204" pitchFamily="34" charset="0"/>
-              <a:buNone/>
-              <a:defRPr sz="1600" b="1" kern="1200">
-                <a:solidFill>
-                  <a:schemeClr val="tx1"/>
-                </a:solidFill>
-                <a:latin typeface="+mn-lt"/>
-                <a:ea typeface="+mn-ea"/>
-                <a:cs typeface="+mn-cs"/>
-              </a:defRPr>
-            </a:lvl6pPr>
-            <a:lvl7pPr marL="2743200" indent="0" algn="l" defTabSz="914400" rtl="0" eaLnBrk="1" latinLnBrk="0" hangingPunct="1">
-              <a:lnSpc>
-                <a:spcPct val="90000"/>
-              </a:lnSpc>
-              <a:spcBef>
-                <a:spcPts val="500"/>
-              </a:spcBef>
-              <a:buFont typeface="Arial" panose="020B0604020202020204" pitchFamily="34" charset="0"/>
-              <a:buNone/>
-              <a:defRPr sz="1600" b="1" kern="1200">
-                <a:solidFill>
-                  <a:schemeClr val="tx1"/>
-                </a:solidFill>
-                <a:latin typeface="+mn-lt"/>
-                <a:ea typeface="+mn-ea"/>
-                <a:cs typeface="+mn-cs"/>
-              </a:defRPr>
-            </a:lvl7pPr>
-            <a:lvl8pPr marL="3200400" indent="0" algn="l" defTabSz="914400" rtl="0" eaLnBrk="1" latinLnBrk="0" hangingPunct="1">
-              <a:lnSpc>
-                <a:spcPct val="90000"/>
-              </a:lnSpc>
-              <a:spcBef>
-                <a:spcPts val="500"/>
-              </a:spcBef>
-              <a:buFont typeface="Arial" panose="020B0604020202020204" pitchFamily="34" charset="0"/>
-              <a:buNone/>
-              <a:defRPr sz="1600" b="1" kern="1200">
-                <a:solidFill>
-                  <a:schemeClr val="tx1"/>
-                </a:solidFill>
-                <a:latin typeface="+mn-lt"/>
-                <a:ea typeface="+mn-ea"/>
-                <a:cs typeface="+mn-cs"/>
-              </a:defRPr>
-            </a:lvl8pPr>
-            <a:lvl9pPr marL="3657600" indent="0" algn="l" defTabSz="914400" rtl="0" eaLnBrk="1" latinLnBrk="0" hangingPunct="1">
-              <a:lnSpc>
-                <a:spcPct val="90000"/>
-              </a:lnSpc>
-              <a:spcBef>
-                <a:spcPts val="500"/>
-              </a:spcBef>
-              <a:buFont typeface="Arial" panose="020B0604020202020204" pitchFamily="34" charset="0"/>
-              <a:buNone/>
-              <a:defRPr sz="1600" b="1" kern="1200">
-                <a:solidFill>
-                  <a:schemeClr val="tx1"/>
-                </a:solidFill>
-                <a:latin typeface="+mn-lt"/>
-                <a:ea typeface="+mn-ea"/>
-                <a:cs typeface="+mn-cs"/>
-              </a:defRPr>
-            </a:lvl9pPr>
-          </a:lstStyle>
+          <a:lstStyle/>
           <a:p>
             <a:r>
               <a:rPr lang="en-US" dirty="0"/>
-              <a:t>SHUBHAM PATEL</a:t>
-            </a:r>
-          </a:p>
-          <a:p>
-            <a:r>
-              <a:rPr lang="en-US" sz="1200" dirty="0"/>
-              <a:t>191310132108</a:t>
-            </a:r>
-          </a:p>
-        </p:txBody>
-      </p:sp>
-      <p:sp>
-        <p:nvSpPr>
-          <p:cNvPr id="32" name="Text Placeholder 2">
-            <a:extLst>
-              <a:ext uri="{FF2B5EF4-FFF2-40B4-BE49-F238E27FC236}">
-                <a16:creationId xmlns:a16="http://schemas.microsoft.com/office/drawing/2014/main" id="{4ADE42FC-37B8-2E40-DC87-0D9B09411AB9}"/>
-              </a:ext>
-            </a:extLst>
-          </p:cNvPr>
-          <p:cNvSpPr txBox="1">
-            <a:spLocks/>
-          </p:cNvSpPr>
+              <a:t>(24/04 – 30/04)</a:t>
+            </a:r>
+          </a:p>
+        </p:txBody>
+      </p:sp>
+      <p:sp>
+        <p:nvSpPr>
+          <p:cNvPr id="9" name="TextBox 8">
+            <a:extLst>
+              <a:ext uri="{FF2B5EF4-FFF2-40B4-BE49-F238E27FC236}">
+                <a16:creationId xmlns:a16="http://schemas.microsoft.com/office/drawing/2014/main" id="{DAAD2177-F40A-9090-CB1E-1D898A091B8A}"/>
+              </a:ext>
+            </a:extLst>
+          </p:cNvPr>
+          <p:cNvSpPr txBox="1"/>
           <p:nvPr/>
         </p:nvSpPr>
         <p:spPr>
           <a:xfrm>
-            <a:off x="8548984" y="5084523"/>
-            <a:ext cx="2317707" cy="737333"/>
+            <a:off x="2409438" y="3990106"/>
+            <a:ext cx="1722391" cy="369332"/>
           </a:xfrm>
           <a:prstGeom prst="rect">
             <a:avLst/>
           </a:prstGeom>
-        </p:spPr>
-        <p:txBody>
-          <a:bodyPr vert="horz" lIns="91440" tIns="45720" rIns="91440" bIns="45720" rtlCol="0" anchor="ctr">
-            <a:noAutofit/>
+          <a:noFill/>
+        </p:spPr>
+        <p:txBody>
+          <a:bodyPr wrap="square" rtlCol="0">
+            <a:spAutoFit/>
           </a:bodyPr>
-          <a:lstStyle>
-            <a:lvl1pPr marL="0" indent="0" algn="ctr" defTabSz="914400" rtl="0" eaLnBrk="1" latinLnBrk="0" hangingPunct="1">
-              <a:lnSpc>
-                <a:spcPct val="90000"/>
-              </a:lnSpc>
-              <a:spcBef>
-                <a:spcPts val="1000"/>
-              </a:spcBef>
-              <a:buFont typeface="Arial" panose="020B0604020202020204" pitchFamily="34" charset="0"/>
-              <a:buNone/>
-              <a:defRPr lang="en-US" sz="1400" kern="1200" spc="150" baseline="0" dirty="0" smtClean="0">
-                <a:solidFill>
-                  <a:schemeClr val="tx1"/>
-                </a:solidFill>
-                <a:latin typeface="+mj-lt"/>
-                <a:ea typeface="+mj-ea"/>
-                <a:cs typeface="+mj-cs"/>
-              </a:defRPr>
-            </a:lvl1pPr>
-            <a:lvl2pPr marL="457200" indent="0" algn="l" defTabSz="914400" rtl="0" eaLnBrk="1" latinLnBrk="0" hangingPunct="1">
-              <a:lnSpc>
-                <a:spcPct val="90000"/>
-              </a:lnSpc>
-              <a:spcBef>
-                <a:spcPts val="500"/>
-              </a:spcBef>
-              <a:buFont typeface="Arial" panose="020B0604020202020204" pitchFamily="34" charset="0"/>
-              <a:buNone/>
-              <a:defRPr sz="2000" b="1" kern="1200">
-                <a:solidFill>
-                  <a:schemeClr val="tx1"/>
-                </a:solidFill>
-                <a:latin typeface="+mn-lt"/>
-                <a:ea typeface="+mn-ea"/>
-                <a:cs typeface="+mn-cs"/>
-              </a:defRPr>
-            </a:lvl2pPr>
-            <a:lvl3pPr marL="914400" indent="0" algn="l" defTabSz="914400" rtl="0" eaLnBrk="1" latinLnBrk="0" hangingPunct="1">
-              <a:lnSpc>
-                <a:spcPct val="90000"/>
-              </a:lnSpc>
-              <a:spcBef>
-                <a:spcPts val="500"/>
-              </a:spcBef>
-              <a:buFont typeface="Arial" panose="020B0604020202020204" pitchFamily="34" charset="0"/>
-              <a:buNone/>
-              <a:defRPr sz="1800" b="1" kern="1200">
-                <a:solidFill>
-                  <a:schemeClr val="tx1"/>
-                </a:solidFill>
-                <a:latin typeface="+mn-lt"/>
-                <a:ea typeface="+mn-ea"/>
-                <a:cs typeface="+mn-cs"/>
-              </a:defRPr>
-            </a:lvl3pPr>
-            <a:lvl4pPr marL="1371600" indent="0" algn="l" defTabSz="914400" rtl="0" eaLnBrk="1" latinLnBrk="0" hangingPunct="1">
-              <a:lnSpc>
-                <a:spcPct val="90000"/>
-              </a:lnSpc>
-              <a:spcBef>
-                <a:spcPts val="500"/>
-              </a:spcBef>
-              <a:buFont typeface="Arial" panose="020B0604020202020204" pitchFamily="34" charset="0"/>
-              <a:buNone/>
-              <a:defRPr sz="1600" b="1" kern="1200">
-                <a:solidFill>
-                  <a:schemeClr val="tx1"/>
-                </a:solidFill>
-                <a:latin typeface="+mn-lt"/>
-                <a:ea typeface="+mn-ea"/>
-                <a:cs typeface="+mn-cs"/>
-              </a:defRPr>
-            </a:lvl4pPr>
-            <a:lvl5pPr marL="1828800" indent="0" algn="l" defTabSz="914400" rtl="0" eaLnBrk="1" latinLnBrk="0" hangingPunct="1">
-              <a:lnSpc>
-                <a:spcPct val="90000"/>
-              </a:lnSpc>
-              <a:spcBef>
-                <a:spcPts val="500"/>
-              </a:spcBef>
-              <a:buFont typeface="Arial" panose="020B0604020202020204" pitchFamily="34" charset="0"/>
-              <a:buNone/>
-              <a:defRPr sz="1600" b="1" kern="1200">
-                <a:solidFill>
-                  <a:schemeClr val="tx1"/>
-                </a:solidFill>
-                <a:latin typeface="+mn-lt"/>
-                <a:ea typeface="+mn-ea"/>
-                <a:cs typeface="+mn-cs"/>
-              </a:defRPr>
-            </a:lvl5pPr>
-            <a:lvl6pPr marL="2286000" indent="0" algn="l" defTabSz="914400" rtl="0" eaLnBrk="1" latinLnBrk="0" hangingPunct="1">
-              <a:lnSpc>
-                <a:spcPct val="90000"/>
-              </a:lnSpc>
-              <a:spcBef>
-                <a:spcPts val="500"/>
-              </a:spcBef>
-              <a:buFont typeface="Arial" panose="020B0604020202020204" pitchFamily="34" charset="0"/>
-              <a:buNone/>
-              <a:defRPr sz="1600" b="1" kern="1200">
-                <a:solidFill>
-                  <a:schemeClr val="tx1"/>
-                </a:solidFill>
-                <a:latin typeface="+mn-lt"/>
-                <a:ea typeface="+mn-ea"/>
-                <a:cs typeface="+mn-cs"/>
-              </a:defRPr>
-            </a:lvl6pPr>
-            <a:lvl7pPr marL="2743200" indent="0" algn="l" defTabSz="914400" rtl="0" eaLnBrk="1" latinLnBrk="0" hangingPunct="1">
-              <a:lnSpc>
-                <a:spcPct val="90000"/>
-              </a:lnSpc>
-              <a:spcBef>
-                <a:spcPts val="500"/>
-              </a:spcBef>
-              <a:buFont typeface="Arial" panose="020B0604020202020204" pitchFamily="34" charset="0"/>
-              <a:buNone/>
-              <a:defRPr sz="1600" b="1" kern="1200">
-                <a:solidFill>
-                  <a:schemeClr val="tx1"/>
-                </a:solidFill>
-                <a:latin typeface="+mn-lt"/>
-                <a:ea typeface="+mn-ea"/>
-                <a:cs typeface="+mn-cs"/>
-              </a:defRPr>
-            </a:lvl7pPr>
-            <a:lvl8pPr marL="3200400" indent="0" algn="l" defTabSz="914400" rtl="0" eaLnBrk="1" latinLnBrk="0" hangingPunct="1">
-              <a:lnSpc>
-                <a:spcPct val="90000"/>
-              </a:lnSpc>
-              <a:spcBef>
-                <a:spcPts val="500"/>
-              </a:spcBef>
-              <a:buFont typeface="Arial" panose="020B0604020202020204" pitchFamily="34" charset="0"/>
-              <a:buNone/>
-              <a:defRPr sz="1600" b="1" kern="1200">
-                <a:solidFill>
-                  <a:schemeClr val="tx1"/>
-                </a:solidFill>
-                <a:latin typeface="+mn-lt"/>
-                <a:ea typeface="+mn-ea"/>
-                <a:cs typeface="+mn-cs"/>
-              </a:defRPr>
-            </a:lvl8pPr>
-            <a:lvl9pPr marL="3657600" indent="0" algn="l" defTabSz="914400" rtl="0" eaLnBrk="1" latinLnBrk="0" hangingPunct="1">
-              <a:lnSpc>
-                <a:spcPct val="90000"/>
-              </a:lnSpc>
-              <a:spcBef>
-                <a:spcPts val="500"/>
-              </a:spcBef>
-              <a:buFont typeface="Arial" panose="020B0604020202020204" pitchFamily="34" charset="0"/>
-              <a:buNone/>
-              <a:defRPr sz="1600" b="1" kern="1200">
-                <a:solidFill>
-                  <a:schemeClr val="tx1"/>
-                </a:solidFill>
-                <a:latin typeface="+mn-lt"/>
-                <a:ea typeface="+mn-ea"/>
-                <a:cs typeface="+mn-cs"/>
-              </a:defRPr>
-            </a:lvl9pPr>
-          </a:lstStyle>
+          <a:lstStyle/>
           <a:p>
             <a:r>
               <a:rPr lang="en-US" dirty="0"/>
-              <a:t>YASH SONI</a:t>
-            </a:r>
-          </a:p>
-          <a:p>
-            <a:r>
-              <a:rPr lang="en-US" sz="1200" dirty="0"/>
-              <a:t>191310132020</a:t>
-            </a:r>
-          </a:p>
-        </p:txBody>
-      </p:sp>
-      <p:pic>
-        <p:nvPicPr>
-          <p:cNvPr id="19" name="Picture Placeholder 18" descr="A person with a beard&#10;&#10;Description automatically generated with medium confidence">
-            <a:extLst>
-              <a:ext uri="{FF2B5EF4-FFF2-40B4-BE49-F238E27FC236}">
-                <a16:creationId xmlns:a16="http://schemas.microsoft.com/office/drawing/2014/main" id="{EC4FBEEA-DA75-3B70-B5B4-C52406435A5E}"/>
-              </a:ext>
-            </a:extLst>
-          </p:cNvPr>
-          <p:cNvPicPr>
-            <a:picLocks noGrp="1" noChangeAspect="1"/>
-          </p:cNvPicPr>
-          <p:nvPr>
-            <p:ph type="pic" sz="quarter" idx="15"/>
-          </p:nvPr>
-        </p:nvPicPr>
-        <p:blipFill rotWithShape="1">
-          <a:blip r:embed="rId2"/>
-          <a:srcRect l="-3605" t="9340" r="3566" b="44193"/>
-          <a:stretch/>
-        </p:blipFill>
-        <p:spPr>
-          <a:xfrm>
-            <a:off x="3836914" y="2886074"/>
-            <a:ext cx="1845511" cy="1845511"/>
-          </a:xfrm>
-        </p:spPr>
-      </p:pic>
-      <p:pic>
-        <p:nvPicPr>
-          <p:cNvPr id="11" name="Picture Placeholder 10" descr="A person sitting on a rock&#10;&#10;Description automatically generated with medium confidence">
-            <a:extLst>
-              <a:ext uri="{FF2B5EF4-FFF2-40B4-BE49-F238E27FC236}">
-                <a16:creationId xmlns:a16="http://schemas.microsoft.com/office/drawing/2014/main" id="{2771F5C5-D1EB-41BC-6E08-30B4D85F7925}"/>
-              </a:ext>
-            </a:extLst>
-          </p:cNvPr>
-          <p:cNvPicPr>
-            <a:picLocks noGrp="1" noChangeAspect="1"/>
-          </p:cNvPicPr>
-          <p:nvPr>
-            <p:ph type="pic" sz="quarter" idx="17"/>
-          </p:nvPr>
-        </p:nvPicPr>
-        <p:blipFill rotWithShape="1">
-          <a:blip r:embed="rId3"/>
-          <a:srcRect l="40432" t="3484" r="30430" b="73015"/>
-          <a:stretch/>
-        </p:blipFill>
-        <p:spPr>
-          <a:xfrm>
-            <a:off x="8747458" y="2886074"/>
-            <a:ext cx="1845511" cy="1845511"/>
-          </a:xfrm>
-        </p:spPr>
-      </p:pic>
-      <p:pic>
-        <p:nvPicPr>
-          <p:cNvPr id="7" name="Picture Placeholder 6" descr="A person wearing glasses&#10;&#10;Description automatically generated with medium confidence">
-            <a:extLst>
-              <a:ext uri="{FF2B5EF4-FFF2-40B4-BE49-F238E27FC236}">
-                <a16:creationId xmlns:a16="http://schemas.microsoft.com/office/drawing/2014/main" id="{05AA776C-EFC7-558A-75F4-9C354AD6F295}"/>
-              </a:ext>
-            </a:extLst>
-          </p:cNvPr>
-          <p:cNvPicPr>
-            <a:picLocks noGrp="1" noChangeAspect="1"/>
-          </p:cNvPicPr>
-          <p:nvPr>
-            <p:ph type="pic" sz="quarter" idx="16"/>
-          </p:nvPr>
-        </p:nvPicPr>
-        <p:blipFill rotWithShape="1">
-          <a:blip r:embed="rId4"/>
-          <a:srcRect l="7237" t="10322" r="-2001" b="39955"/>
-          <a:stretch/>
-        </p:blipFill>
-        <p:spPr>
-          <a:xfrm>
-            <a:off x="6327578" y="2886074"/>
-            <a:ext cx="1845511" cy="1845511"/>
-          </a:xfrm>
-        </p:spPr>
-      </p:pic>
-      <p:pic>
-        <p:nvPicPr>
-          <p:cNvPr id="12" name="Picture Placeholder 11" descr="A person with a mustache&#10;&#10;Description automatically generated with medium confidence">
-            <a:extLst>
-              <a:ext uri="{FF2B5EF4-FFF2-40B4-BE49-F238E27FC236}">
-                <a16:creationId xmlns:a16="http://schemas.microsoft.com/office/drawing/2014/main" id="{19EAF837-4DBC-57A7-D1F1-6C31D8E9AD1B}"/>
-              </a:ext>
-            </a:extLst>
-          </p:cNvPr>
-          <p:cNvPicPr>
-            <a:picLocks noGrp="1" noChangeAspect="1"/>
-          </p:cNvPicPr>
-          <p:nvPr>
-            <p:ph type="pic" sz="quarter" idx="14"/>
-          </p:nvPr>
-        </p:nvPicPr>
-        <p:blipFill rotWithShape="1">
-          <a:blip r:embed="rId5"/>
-          <a:srcRect l="18286" t="23429" r="19540" b="41568"/>
-          <a:stretch/>
-        </p:blipFill>
-        <p:spPr>
-          <a:xfrm>
-            <a:off x="1487181" y="2886074"/>
-            <a:ext cx="1845511" cy="1845511"/>
-          </a:xfrm>
-        </p:spPr>
-      </p:pic>
+              <a:t>(01/05 – 07/05)</a:t>
+            </a:r>
+          </a:p>
+        </p:txBody>
+      </p:sp>
+      <p:sp>
+        <p:nvSpPr>
+          <p:cNvPr id="10" name="TextBox 9">
+            <a:extLst>
+              <a:ext uri="{FF2B5EF4-FFF2-40B4-BE49-F238E27FC236}">
+                <a16:creationId xmlns:a16="http://schemas.microsoft.com/office/drawing/2014/main" id="{CD23511D-0E46-3E82-7053-BB346D0E3866}"/>
+              </a:ext>
+            </a:extLst>
+          </p:cNvPr>
+          <p:cNvSpPr txBox="1"/>
+          <p:nvPr/>
+        </p:nvSpPr>
+        <p:spPr>
+          <a:xfrm>
+            <a:off x="2964225" y="5066432"/>
+            <a:ext cx="1722391" cy="369332"/>
+          </a:xfrm>
+          <a:prstGeom prst="rect">
+            <a:avLst/>
+          </a:prstGeom>
+          <a:noFill/>
+        </p:spPr>
+        <p:txBody>
+          <a:bodyPr wrap="square" rtlCol="0">
+            <a:spAutoFit/>
+          </a:bodyPr>
+          <a:lstStyle/>
+          <a:p>
+            <a:r>
+              <a:rPr lang="en-US" dirty="0"/>
+              <a:t>(08/05 – 10/05)</a:t>
+            </a:r>
+          </a:p>
+        </p:txBody>
+      </p:sp>
+      <p:sp>
+        <p:nvSpPr>
+          <p:cNvPr id="11" name="TextBox 10">
+            <a:extLst>
+              <a:ext uri="{FF2B5EF4-FFF2-40B4-BE49-F238E27FC236}">
+                <a16:creationId xmlns:a16="http://schemas.microsoft.com/office/drawing/2014/main" id="{57F07A55-9F02-7BF8-B9D9-DD6AFE6DF019}"/>
+              </a:ext>
+            </a:extLst>
+          </p:cNvPr>
+          <p:cNvSpPr txBox="1"/>
+          <p:nvPr/>
+        </p:nvSpPr>
+        <p:spPr>
+          <a:xfrm>
+            <a:off x="2581835" y="427625"/>
+            <a:ext cx="7709648" cy="646331"/>
+          </a:xfrm>
+          <a:prstGeom prst="rect">
+            <a:avLst/>
+          </a:prstGeom>
+          <a:noFill/>
+        </p:spPr>
+        <p:txBody>
+          <a:bodyPr wrap="square" rtlCol="0">
+            <a:spAutoFit/>
+          </a:bodyPr>
+          <a:lstStyle/>
+          <a:p>
+            <a:r>
+              <a:rPr lang="en-US" sz="3600" dirty="0"/>
+              <a:t>TIMELINE</a:t>
+            </a:r>
+          </a:p>
+        </p:txBody>
+      </p:sp>
     </p:spTree>
     <p:extLst>
       <p:ext uri="{BB962C8B-B14F-4D97-AF65-F5344CB8AC3E}">
-        <p14:creationId xmlns:p14="http://schemas.microsoft.com/office/powerpoint/2010/main" val="2619301236"/>
+        <p14:creationId xmlns:p14="http://schemas.microsoft.com/office/powerpoint/2010/main" val="3947530056"/>
       </p:ext>
     </p:extLst>
   </p:cSld>
@@ -15227,7 +14923,7 @@
           <p:cNvPr id="2" name="Title 1">
             <a:extLst>
               <a:ext uri="{FF2B5EF4-FFF2-40B4-BE49-F238E27FC236}">
-                <a16:creationId xmlns:a16="http://schemas.microsoft.com/office/drawing/2014/main" id="{4518FC28-E0BD-4387-B8BE-9965D1A57FF1}"/>
+                <a16:creationId xmlns:a16="http://schemas.microsoft.com/office/drawing/2014/main" id="{37564B50-6193-81B2-9D46-83FDC4DF9961}"/>
               </a:ext>
             </a:extLst>
           </p:cNvPr>
@@ -15238,19 +14934,14 @@
             <p:ph type="title"/>
           </p:nvPr>
         </p:nvSpPr>
-        <p:spPr>
-          <a:xfrm>
-            <a:off x="5476875" y="1671639"/>
-            <a:ext cx="5111750" cy="1204912"/>
-          </a:xfrm>
-        </p:spPr>
+        <p:spPr/>
         <p:txBody>
           <a:bodyPr/>
           <a:lstStyle/>
           <a:p>
             <a:r>
               <a:rPr lang="en-US" dirty="0"/>
-              <a:t>SUMMARY</a:t>
+              <a:t>DATASET EDA</a:t>
             </a:r>
           </a:p>
         </p:txBody>
@@ -15260,7 +14951,7 @@
           <p:cNvPr id="3" name="Text Placeholder 2">
             <a:extLst>
               <a:ext uri="{FF2B5EF4-FFF2-40B4-BE49-F238E27FC236}">
-                <a16:creationId xmlns:a16="http://schemas.microsoft.com/office/drawing/2014/main" id="{FED19BCA-B61F-4EA6-A1FB-CCA3BD8506FB}"/>
+                <a16:creationId xmlns:a16="http://schemas.microsoft.com/office/drawing/2014/main" id="{59A6933F-6D74-96A7-00DC-C486F0F10082}"/>
               </a:ext>
             </a:extLst>
           </p:cNvPr>
@@ -15273,79 +14964,8 @@
         </p:nvSpPr>
         <p:spPr>
           <a:xfrm>
-            <a:off x="5476874" y="3660773"/>
-            <a:ext cx="5576607" cy="2426262"/>
-          </a:xfrm>
-        </p:spPr>
-        <p:txBody>
-          <a:bodyPr>
-            <a:normAutofit/>
-          </a:bodyPr>
-          <a:lstStyle/>
-          <a:p>
-            <a:r>
-              <a:rPr lang="en-US" dirty="0"/>
-              <a:t>So far, for malware detection using ML, we’ve done basic data cleaning, vectorization of log files, application and visualization of ML using Weka and </a:t>
-            </a:r>
-            <a:r>
-              <a:rPr lang="en-US" dirty="0" err="1"/>
-              <a:t>Sklearn</a:t>
-            </a:r>
-            <a:r>
-              <a:rPr lang="en-US" dirty="0"/>
-              <a:t>, </a:t>
-            </a:r>
-            <a:r>
-              <a:rPr lang="en-US" dirty="0" err="1"/>
-              <a:t>Tensorflow</a:t>
-            </a:r>
-            <a:r>
-              <a:rPr lang="en-US" dirty="0"/>
-              <a:t>.</a:t>
-            </a:r>
-          </a:p>
-          <a:p>
-            <a:r>
-              <a:rPr lang="en-US" dirty="0"/>
-              <a:t>	We then found a new dataset including 100 </a:t>
-            </a:r>
-            <a:r>
-              <a:rPr lang="en-US" dirty="0" err="1"/>
-              <a:t>api</a:t>
-            </a:r>
-            <a:r>
-              <a:rPr lang="en-US" dirty="0"/>
-              <a:t> calls from the files and built traditional as well as deep learning models on it. Lastly, we deployed and hosted the best model on external server for public access.</a:t>
-            </a:r>
-          </a:p>
-          <a:p>
-            <a:r>
-              <a:rPr lang="en-US" dirty="0"/>
-              <a:t>In the upcoming weeks, we’re planning to complete the required documentation for the project.</a:t>
-            </a:r>
-          </a:p>
-        </p:txBody>
-      </p:sp>
-      <p:sp>
-        <p:nvSpPr>
-          <p:cNvPr id="4" name="Date Placeholder 3">
-            <a:extLst>
-              <a:ext uri="{FF2B5EF4-FFF2-40B4-BE49-F238E27FC236}">
-                <a16:creationId xmlns:a16="http://schemas.microsoft.com/office/drawing/2014/main" id="{00560550-EE65-43CE-B899-F421E74287A1}"/>
-              </a:ext>
-            </a:extLst>
-          </p:cNvPr>
-          <p:cNvSpPr>
-            <a:spLocks noGrp="1"/>
-          </p:cNvSpPr>
-          <p:nvPr>
-            <p:ph type="dt" sz="half" idx="10"/>
-          </p:nvPr>
-        </p:nvSpPr>
-        <p:spPr>
-          <a:xfrm>
-            <a:off x="838200" y="6356350"/>
-            <a:ext cx="2743200" cy="365125"/>
+            <a:off x="2933700" y="1953024"/>
+            <a:ext cx="3924300" cy="823912"/>
           </a:xfrm>
         </p:spPr>
         <p:txBody>
@@ -15354,31 +14974,31 @@
           <a:p>
             <a:r>
               <a:rPr lang="en-US" dirty="0"/>
-              <a:t>20XX</a:t>
-            </a:r>
-          </a:p>
-        </p:txBody>
-      </p:sp>
-      <p:sp>
-        <p:nvSpPr>
-          <p:cNvPr id="5" name="Footer Placeholder 4">
-            <a:extLst>
-              <a:ext uri="{FF2B5EF4-FFF2-40B4-BE49-F238E27FC236}">
-                <a16:creationId xmlns:a16="http://schemas.microsoft.com/office/drawing/2014/main" id="{4135E32A-1A8C-43D2-9C6E-12887B4DEDFB}"/>
-              </a:ext>
-            </a:extLst>
-          </p:cNvPr>
-          <p:cNvSpPr>
-            <a:spLocks noGrp="1"/>
-          </p:cNvSpPr>
-          <p:nvPr>
-            <p:ph type="ftr" sz="quarter" idx="11"/>
-          </p:nvPr>
-        </p:nvSpPr>
-        <p:spPr>
-          <a:xfrm>
-            <a:off x="4038600" y="6356350"/>
-            <a:ext cx="4114800" cy="365125"/>
+              <a:t>DATASET CSV</a:t>
+            </a:r>
+          </a:p>
+        </p:txBody>
+      </p:sp>
+      <p:sp>
+        <p:nvSpPr>
+          <p:cNvPr id="5" name="Text Placeholder 4">
+            <a:extLst>
+              <a:ext uri="{FF2B5EF4-FFF2-40B4-BE49-F238E27FC236}">
+                <a16:creationId xmlns:a16="http://schemas.microsoft.com/office/drawing/2014/main" id="{3BE8EFEA-A006-66F5-D2A1-C65CAEB8F001}"/>
+              </a:ext>
+            </a:extLst>
+          </p:cNvPr>
+          <p:cNvSpPr>
+            <a:spLocks noGrp="1"/>
+          </p:cNvSpPr>
+          <p:nvPr>
+            <p:ph type="body" sz="quarter" idx="3"/>
+          </p:nvPr>
+        </p:nvSpPr>
+        <p:spPr>
+          <a:xfrm>
+            <a:off x="7410310" y="1953024"/>
+            <a:ext cx="3943627" cy="823912"/>
           </a:xfrm>
         </p:spPr>
         <p:txBody>
@@ -15387,17 +15007,102 @@
           <a:p>
             <a:r>
               <a:rPr lang="en-US" dirty="0"/>
-              <a:t>PRESENTATION TITLE</a:t>
-            </a:r>
-          </a:p>
-        </p:txBody>
-      </p:sp>
-      <p:sp>
-        <p:nvSpPr>
-          <p:cNvPr id="6" name="Slide Number Placeholder 5">
-            <a:extLst>
-              <a:ext uri="{FF2B5EF4-FFF2-40B4-BE49-F238E27FC236}">
-                <a16:creationId xmlns:a16="http://schemas.microsoft.com/office/drawing/2014/main" id="{7C4B8313-9270-4128-8674-3A3E42B806BC}"/>
+              <a:t>DATASET DISTRIBUTION</a:t>
+            </a:r>
+          </a:p>
+        </p:txBody>
+      </p:sp>
+      <p:pic>
+        <p:nvPicPr>
+          <p:cNvPr id="15" name="Content Placeholder 14">
+            <a:extLst>
+              <a:ext uri="{FF2B5EF4-FFF2-40B4-BE49-F238E27FC236}">
+                <a16:creationId xmlns:a16="http://schemas.microsoft.com/office/drawing/2014/main" id="{A7E2FFA5-2DF7-6806-6E72-B7C1333AD94E}"/>
+              </a:ext>
+            </a:extLst>
+          </p:cNvPr>
+          <p:cNvPicPr>
+            <a:picLocks noGrp="1" noChangeAspect="1"/>
+          </p:cNvPicPr>
+          <p:nvPr>
+            <p:ph sz="quarter" idx="4"/>
+          </p:nvPr>
+        </p:nvPicPr>
+        <p:blipFill>
+          <a:blip r:embed="rId2"/>
+          <a:stretch>
+            <a:fillRect/>
+          </a:stretch>
+        </p:blipFill>
+        <p:spPr>
+          <a:xfrm>
+            <a:off x="6858000" y="3081733"/>
+            <a:ext cx="5148668" cy="2750741"/>
+          </a:xfrm>
+        </p:spPr>
+      </p:pic>
+      <p:sp>
+        <p:nvSpPr>
+          <p:cNvPr id="7" name="Date Placeholder 6">
+            <a:extLst>
+              <a:ext uri="{FF2B5EF4-FFF2-40B4-BE49-F238E27FC236}">
+                <a16:creationId xmlns:a16="http://schemas.microsoft.com/office/drawing/2014/main" id="{06B9F333-35DF-32FE-1911-A6419439BF89}"/>
+              </a:ext>
+            </a:extLst>
+          </p:cNvPr>
+          <p:cNvSpPr>
+            <a:spLocks noGrp="1"/>
+          </p:cNvSpPr>
+          <p:nvPr>
+            <p:ph type="dt" sz="half" idx="10"/>
+          </p:nvPr>
+        </p:nvSpPr>
+        <p:spPr/>
+        <p:txBody>
+          <a:bodyPr/>
+          <a:lstStyle/>
+          <a:p>
+            <a:r>
+              <a:rPr lang="en-US" dirty="0"/>
+              <a:t>2023</a:t>
+            </a:r>
+          </a:p>
+        </p:txBody>
+      </p:sp>
+      <p:sp>
+        <p:nvSpPr>
+          <p:cNvPr id="8" name="Footer Placeholder 7">
+            <a:extLst>
+              <a:ext uri="{FF2B5EF4-FFF2-40B4-BE49-F238E27FC236}">
+                <a16:creationId xmlns:a16="http://schemas.microsoft.com/office/drawing/2014/main" id="{BF0D6E6E-5888-621A-1914-53BFE33237E0}"/>
+              </a:ext>
+            </a:extLst>
+          </p:cNvPr>
+          <p:cNvSpPr>
+            <a:spLocks noGrp="1"/>
+          </p:cNvSpPr>
+          <p:nvPr>
+            <p:ph type="ftr" sz="quarter" idx="11"/>
+          </p:nvPr>
+        </p:nvSpPr>
+        <p:spPr/>
+        <p:txBody>
+          <a:bodyPr/>
+          <a:lstStyle/>
+          <a:p>
+            <a:r>
+              <a:rPr lang="en-US" dirty="0"/>
+              <a:t>MALWARE DETECTION USING ML</a:t>
+            </a:r>
+          </a:p>
+        </p:txBody>
+      </p:sp>
+      <p:sp>
+        <p:nvSpPr>
+          <p:cNvPr id="9" name="Slide Number Placeholder 8">
+            <a:extLst>
+              <a:ext uri="{FF2B5EF4-FFF2-40B4-BE49-F238E27FC236}">
+                <a16:creationId xmlns:a16="http://schemas.microsoft.com/office/drawing/2014/main" id="{A2AC1059-BD0E-8D87-BBD3-A3A624C42B47}"/>
               </a:ext>
             </a:extLst>
           </p:cNvPr>
@@ -15408,12 +15113,7 @@
             <p:ph type="sldNum" sz="quarter" idx="12"/>
           </p:nvPr>
         </p:nvSpPr>
-        <p:spPr>
-          <a:xfrm>
-            <a:off x="8610600" y="6356350"/>
-            <a:ext cx="2743200" cy="365125"/>
-          </a:xfrm>
-        </p:spPr>
+        <p:spPr/>
         <p:txBody>
           <a:bodyPr/>
           <a:lstStyle/>
@@ -15427,10 +15127,39 @@
           </a:p>
         </p:txBody>
       </p:sp>
+      <p:pic>
+        <p:nvPicPr>
+          <p:cNvPr id="25" name="Content Placeholder 24">
+            <a:extLst>
+              <a:ext uri="{FF2B5EF4-FFF2-40B4-BE49-F238E27FC236}">
+                <a16:creationId xmlns:a16="http://schemas.microsoft.com/office/drawing/2014/main" id="{6538F4E8-F99F-E63D-5267-52560350AD9F}"/>
+              </a:ext>
+            </a:extLst>
+          </p:cNvPr>
+          <p:cNvPicPr>
+            <a:picLocks noGrp="1" noChangeAspect="1"/>
+          </p:cNvPicPr>
+          <p:nvPr>
+            <p:ph sz="half" idx="2"/>
+          </p:nvPr>
+        </p:nvPicPr>
+        <p:blipFill>
+          <a:blip r:embed="rId3"/>
+          <a:stretch>
+            <a:fillRect/>
+          </a:stretch>
+        </p:blipFill>
+        <p:spPr>
+          <a:xfrm>
+            <a:off x="273422" y="3081733"/>
+            <a:ext cx="6073590" cy="2753511"/>
+          </a:xfrm>
+        </p:spPr>
+      </p:pic>
     </p:spTree>
     <p:extLst>
       <p:ext uri="{BB962C8B-B14F-4D97-AF65-F5344CB8AC3E}">
-        <p14:creationId xmlns:p14="http://schemas.microsoft.com/office/powerpoint/2010/main" val="1742861620"/>
+        <p14:creationId xmlns:p14="http://schemas.microsoft.com/office/powerpoint/2010/main" val="3738977994"/>
       </p:ext>
     </p:extLst>
   </p:cSld>
@@ -15462,54 +15191,1254 @@
           <p:cNvPr id="2" name="Title 1">
             <a:extLst>
               <a:ext uri="{FF2B5EF4-FFF2-40B4-BE49-F238E27FC236}">
-                <a16:creationId xmlns:a16="http://schemas.microsoft.com/office/drawing/2014/main" id="{8BDF1EDE-5423-435C-B149-87AB1BC22B83}"/>
-              </a:ext>
-            </a:extLst>
-          </p:cNvPr>
-          <p:cNvSpPr>
-            <a:spLocks noGrp="1"/>
-          </p:cNvSpPr>
-          <p:nvPr>
-            <p:ph type="ctrTitle"/>
-          </p:nvPr>
-        </p:nvSpPr>
-        <p:spPr>
-          <a:xfrm>
-            <a:off x="4267200" y="1615736"/>
-            <a:ext cx="4179570" cy="1524735"/>
-          </a:xfrm>
-        </p:spPr>
+                <a16:creationId xmlns:a16="http://schemas.microsoft.com/office/drawing/2014/main" id="{37564B50-6193-81B2-9D46-83FDC4DF9961}"/>
+              </a:ext>
+            </a:extLst>
+          </p:cNvPr>
+          <p:cNvSpPr>
+            <a:spLocks noGrp="1"/>
+          </p:cNvSpPr>
+          <p:nvPr>
+            <p:ph type="title"/>
+          </p:nvPr>
+        </p:nvSpPr>
+        <p:spPr/>
         <p:txBody>
           <a:bodyPr/>
           <a:lstStyle/>
           <a:p>
             <a:r>
               <a:rPr lang="en-US" dirty="0"/>
-              <a:t>THANK YOU</a:t>
-            </a:r>
-          </a:p>
-        </p:txBody>
-      </p:sp>
-      <p:sp>
-        <p:nvSpPr>
-          <p:cNvPr id="3" name="Subtitle 2">
-            <a:extLst>
-              <a:ext uri="{FF2B5EF4-FFF2-40B4-BE49-F238E27FC236}">
-                <a16:creationId xmlns:a16="http://schemas.microsoft.com/office/drawing/2014/main" id="{AF64C29E-DF30-4DC6-AB95-2016F9A703B6}"/>
-              </a:ext>
-            </a:extLst>
-          </p:cNvPr>
-          <p:cNvSpPr>
-            <a:spLocks noGrp="1"/>
-          </p:cNvSpPr>
-          <p:nvPr>
-            <p:ph type="subTitle" idx="1"/>
-          </p:nvPr>
-        </p:nvSpPr>
-        <p:spPr>
-          <a:xfrm>
-            <a:off x="4267199" y="3238103"/>
-            <a:ext cx="7413813" cy="1773168"/>
+              <a:t>ML MODEL DEVELOPMENT</a:t>
+            </a:r>
+          </a:p>
+        </p:txBody>
+      </p:sp>
+      <p:sp>
+        <p:nvSpPr>
+          <p:cNvPr id="3" name="Text Placeholder 2">
+            <a:extLst>
+              <a:ext uri="{FF2B5EF4-FFF2-40B4-BE49-F238E27FC236}">
+                <a16:creationId xmlns:a16="http://schemas.microsoft.com/office/drawing/2014/main" id="{59A6933F-6D74-96A7-00DC-C486F0F10082}"/>
+              </a:ext>
+            </a:extLst>
+          </p:cNvPr>
+          <p:cNvSpPr>
+            <a:spLocks noGrp="1"/>
+          </p:cNvSpPr>
+          <p:nvPr>
+            <p:ph type="body" idx="1"/>
+          </p:nvPr>
+        </p:nvSpPr>
+        <p:spPr>
+          <a:xfrm>
+            <a:off x="2933700" y="1953024"/>
+            <a:ext cx="3924300" cy="823912"/>
+          </a:xfrm>
+        </p:spPr>
+        <p:txBody>
+          <a:bodyPr/>
+          <a:lstStyle/>
+          <a:p>
+            <a:r>
+              <a:rPr lang="en-US" dirty="0"/>
+              <a:t>METRICS BOXPLOT</a:t>
+            </a:r>
+          </a:p>
+        </p:txBody>
+      </p:sp>
+      <p:sp>
+        <p:nvSpPr>
+          <p:cNvPr id="5" name="Text Placeholder 4">
+            <a:extLst>
+              <a:ext uri="{FF2B5EF4-FFF2-40B4-BE49-F238E27FC236}">
+                <a16:creationId xmlns:a16="http://schemas.microsoft.com/office/drawing/2014/main" id="{3BE8EFEA-A006-66F5-D2A1-C65CAEB8F001}"/>
+              </a:ext>
+            </a:extLst>
+          </p:cNvPr>
+          <p:cNvSpPr>
+            <a:spLocks noGrp="1"/>
+          </p:cNvSpPr>
+          <p:nvPr>
+            <p:ph type="body" sz="quarter" idx="3"/>
+          </p:nvPr>
+        </p:nvSpPr>
+        <p:spPr>
+          <a:xfrm>
+            <a:off x="7688641" y="1953024"/>
+            <a:ext cx="3943627" cy="823912"/>
+          </a:xfrm>
+        </p:spPr>
+        <p:txBody>
+          <a:bodyPr/>
+          <a:lstStyle/>
+          <a:p>
+            <a:r>
+              <a:rPr lang="en-US" dirty="0"/>
+              <a:t>METRICS HEATMAP</a:t>
+            </a:r>
+          </a:p>
+        </p:txBody>
+      </p:sp>
+      <p:sp>
+        <p:nvSpPr>
+          <p:cNvPr id="7" name="Date Placeholder 6">
+            <a:extLst>
+              <a:ext uri="{FF2B5EF4-FFF2-40B4-BE49-F238E27FC236}">
+                <a16:creationId xmlns:a16="http://schemas.microsoft.com/office/drawing/2014/main" id="{06B9F333-35DF-32FE-1911-A6419439BF89}"/>
+              </a:ext>
+            </a:extLst>
+          </p:cNvPr>
+          <p:cNvSpPr>
+            <a:spLocks noGrp="1"/>
+          </p:cNvSpPr>
+          <p:nvPr>
+            <p:ph type="dt" sz="half" idx="10"/>
+          </p:nvPr>
+        </p:nvSpPr>
+        <p:spPr/>
+        <p:txBody>
+          <a:bodyPr/>
+          <a:lstStyle/>
+          <a:p>
+            <a:r>
+              <a:rPr lang="en-US"/>
+              <a:t>20XX</a:t>
+            </a:r>
+            <a:endParaRPr lang="en-US" dirty="0"/>
+          </a:p>
+        </p:txBody>
+      </p:sp>
+      <p:sp>
+        <p:nvSpPr>
+          <p:cNvPr id="8" name="Footer Placeholder 7">
+            <a:extLst>
+              <a:ext uri="{FF2B5EF4-FFF2-40B4-BE49-F238E27FC236}">
+                <a16:creationId xmlns:a16="http://schemas.microsoft.com/office/drawing/2014/main" id="{BF0D6E6E-5888-621A-1914-53BFE33237E0}"/>
+              </a:ext>
+            </a:extLst>
+          </p:cNvPr>
+          <p:cNvSpPr>
+            <a:spLocks noGrp="1"/>
+          </p:cNvSpPr>
+          <p:nvPr>
+            <p:ph type="ftr" sz="quarter" idx="11"/>
+          </p:nvPr>
+        </p:nvSpPr>
+        <p:spPr/>
+        <p:txBody>
+          <a:bodyPr/>
+          <a:lstStyle/>
+          <a:p>
+            <a:r>
+              <a:rPr lang="en-US"/>
+              <a:t>PRESENTATION TITLE</a:t>
+            </a:r>
+            <a:endParaRPr lang="en-US" dirty="0"/>
+          </a:p>
+        </p:txBody>
+      </p:sp>
+      <p:sp>
+        <p:nvSpPr>
+          <p:cNvPr id="9" name="Slide Number Placeholder 8">
+            <a:extLst>
+              <a:ext uri="{FF2B5EF4-FFF2-40B4-BE49-F238E27FC236}">
+                <a16:creationId xmlns:a16="http://schemas.microsoft.com/office/drawing/2014/main" id="{A2AC1059-BD0E-8D87-BBD3-A3A624C42B47}"/>
+              </a:ext>
+            </a:extLst>
+          </p:cNvPr>
+          <p:cNvSpPr>
+            <a:spLocks noGrp="1"/>
+          </p:cNvSpPr>
+          <p:nvPr>
+            <p:ph type="sldNum" sz="quarter" idx="12"/>
+          </p:nvPr>
+        </p:nvSpPr>
+        <p:spPr/>
+        <p:txBody>
+          <a:bodyPr/>
+          <a:lstStyle/>
+          <a:p>
+            <a:fld id="{A49DFD55-3C28-40EF-9E31-A92D2E4017FF}" type="slidenum">
+              <a:rPr lang="en-US" smtClean="0"/>
+              <a:pPr/>
+              <a:t>13</a:t>
+            </a:fld>
+            <a:endParaRPr lang="en-US" dirty="0"/>
+          </a:p>
+        </p:txBody>
+      </p:sp>
+      <p:pic>
+        <p:nvPicPr>
+          <p:cNvPr id="11" name="Content Placeholder 10">
+            <a:extLst>
+              <a:ext uri="{FF2B5EF4-FFF2-40B4-BE49-F238E27FC236}">
+                <a16:creationId xmlns:a16="http://schemas.microsoft.com/office/drawing/2014/main" id="{80D22D2C-1667-76C7-BAF5-7F0776CE4040}"/>
+              </a:ext>
+            </a:extLst>
+          </p:cNvPr>
+          <p:cNvPicPr>
+            <a:picLocks noGrp="1" noChangeAspect="1"/>
+          </p:cNvPicPr>
+          <p:nvPr>
+            <p:ph sz="half" idx="2"/>
+          </p:nvPr>
+        </p:nvPicPr>
+        <p:blipFill>
+          <a:blip r:embed="rId2"/>
+          <a:stretch>
+            <a:fillRect/>
+          </a:stretch>
+        </p:blipFill>
+        <p:spPr>
+          <a:xfrm>
+            <a:off x="2563696" y="3081086"/>
+            <a:ext cx="3460586" cy="2750094"/>
+          </a:xfrm>
+        </p:spPr>
+      </p:pic>
+      <p:pic>
+        <p:nvPicPr>
+          <p:cNvPr id="16" name="Content Placeholder 15">
+            <a:extLst>
+              <a:ext uri="{FF2B5EF4-FFF2-40B4-BE49-F238E27FC236}">
+                <a16:creationId xmlns:a16="http://schemas.microsoft.com/office/drawing/2014/main" id="{1CD9DADC-A52D-B8B7-8F4A-E0D6193BED02}"/>
+              </a:ext>
+            </a:extLst>
+          </p:cNvPr>
+          <p:cNvPicPr>
+            <a:picLocks noGrp="1" noChangeAspect="1"/>
+          </p:cNvPicPr>
+          <p:nvPr>
+            <p:ph sz="quarter" idx="4"/>
+          </p:nvPr>
+        </p:nvPicPr>
+        <p:blipFill>
+          <a:blip r:embed="rId3"/>
+          <a:stretch>
+            <a:fillRect/>
+          </a:stretch>
+        </p:blipFill>
+        <p:spPr>
+          <a:xfrm>
+            <a:off x="7410310" y="3081086"/>
+            <a:ext cx="3256852" cy="2750094"/>
+          </a:xfrm>
+        </p:spPr>
+      </p:pic>
+    </p:spTree>
+    <p:extLst>
+      <p:ext uri="{BB962C8B-B14F-4D97-AF65-F5344CB8AC3E}">
+        <p14:creationId xmlns:p14="http://schemas.microsoft.com/office/powerpoint/2010/main" val="988548671"/>
+      </p:ext>
+    </p:extLst>
+  </p:cSld>
+  <p:clrMapOvr>
+    <a:masterClrMapping/>
+  </p:clrMapOvr>
+</p:sld>
+</file>
+
+<file path=ppt/slides/slide14.xml><?xml version="1.0" encoding="utf-8"?>
+<p:sld xmlns:a="http://schemas.openxmlformats.org/drawingml/2006/main" xmlns:r="http://schemas.openxmlformats.org/officeDocument/2006/relationships" xmlns:p="http://schemas.openxmlformats.org/presentationml/2006/main">
+  <p:cSld>
+    <p:spTree>
+      <p:nvGrpSpPr>
+        <p:cNvPr id="1" name=""/>
+        <p:cNvGrpSpPr/>
+        <p:nvPr/>
+      </p:nvGrpSpPr>
+      <p:grpSpPr>
+        <a:xfrm>
+          <a:off x="0" y="0"/>
+          <a:ext cx="0" cy="0"/>
+          <a:chOff x="0" y="0"/>
+          <a:chExt cx="0" cy="0"/>
+        </a:xfrm>
+      </p:grpSpPr>
+      <p:sp>
+        <p:nvSpPr>
+          <p:cNvPr id="2" name="Title 1">
+            <a:extLst>
+              <a:ext uri="{FF2B5EF4-FFF2-40B4-BE49-F238E27FC236}">
+                <a16:creationId xmlns:a16="http://schemas.microsoft.com/office/drawing/2014/main" id="{4F6A2D15-4D68-4BF7-9421-032AE6C8852C}"/>
+              </a:ext>
+            </a:extLst>
+          </p:cNvPr>
+          <p:cNvSpPr>
+            <a:spLocks noGrp="1"/>
+          </p:cNvSpPr>
+          <p:nvPr>
+            <p:ph type="title"/>
+          </p:nvPr>
+        </p:nvSpPr>
+        <p:spPr>
+          <a:xfrm>
+            <a:off x="1885156" y="892177"/>
+            <a:ext cx="8421688" cy="1325563"/>
+          </a:xfrm>
+        </p:spPr>
+        <p:txBody>
+          <a:bodyPr/>
+          <a:lstStyle/>
+          <a:p>
+            <a:r>
+              <a:rPr lang="en-US" dirty="0"/>
+              <a:t>MEET OUR TEAM</a:t>
+            </a:r>
+          </a:p>
+        </p:txBody>
+      </p:sp>
+      <p:sp>
+        <p:nvSpPr>
+          <p:cNvPr id="3" name="Text Placeholder 2">
+            <a:extLst>
+              <a:ext uri="{FF2B5EF4-FFF2-40B4-BE49-F238E27FC236}">
+                <a16:creationId xmlns:a16="http://schemas.microsoft.com/office/drawing/2014/main" id="{78BCC184-1096-457B-AB72-BD49E6E54117}"/>
+              </a:ext>
+            </a:extLst>
+          </p:cNvPr>
+          <p:cNvSpPr>
+            <a:spLocks noGrp="1"/>
+          </p:cNvSpPr>
+          <p:nvPr>
+            <p:ph type="body" idx="1"/>
+          </p:nvPr>
+        </p:nvSpPr>
+        <p:spPr>
+          <a:xfrm>
+            <a:off x="1228568" y="5084524"/>
+            <a:ext cx="2317707" cy="737333"/>
+          </a:xfrm>
+        </p:spPr>
+        <p:txBody>
+          <a:bodyPr/>
+          <a:lstStyle/>
+          <a:p>
+            <a:r>
+              <a:rPr lang="en-US" dirty="0"/>
+              <a:t>SHASHANK SHARMA</a:t>
+            </a:r>
+          </a:p>
+          <a:p>
+            <a:r>
+              <a:rPr lang="en-US" sz="1200" dirty="0"/>
+              <a:t>191310132134</a:t>
+            </a:r>
+          </a:p>
+        </p:txBody>
+      </p:sp>
+      <p:sp>
+        <p:nvSpPr>
+          <p:cNvPr id="23" name="Date Placeholder 22">
+            <a:extLst>
+              <a:ext uri="{FF2B5EF4-FFF2-40B4-BE49-F238E27FC236}">
+                <a16:creationId xmlns:a16="http://schemas.microsoft.com/office/drawing/2014/main" id="{637DEDF5-3FCD-4BC2-86A5-7BE2BF01EA38}"/>
+              </a:ext>
+            </a:extLst>
+          </p:cNvPr>
+          <p:cNvSpPr>
+            <a:spLocks noGrp="1"/>
+          </p:cNvSpPr>
+          <p:nvPr>
+            <p:ph type="dt" sz="half" idx="10"/>
+          </p:nvPr>
+        </p:nvSpPr>
+        <p:spPr>
+          <a:xfrm>
+            <a:off x="838200" y="6356350"/>
+            <a:ext cx="2743200" cy="365125"/>
+          </a:xfrm>
+        </p:spPr>
+        <p:txBody>
+          <a:bodyPr/>
+          <a:lstStyle/>
+          <a:p>
+            <a:r>
+              <a:rPr lang="en-US" dirty="0"/>
+              <a:t>2023</a:t>
+            </a:r>
+          </a:p>
+        </p:txBody>
+      </p:sp>
+      <p:sp>
+        <p:nvSpPr>
+          <p:cNvPr id="24" name="Footer Placeholder 23">
+            <a:extLst>
+              <a:ext uri="{FF2B5EF4-FFF2-40B4-BE49-F238E27FC236}">
+                <a16:creationId xmlns:a16="http://schemas.microsoft.com/office/drawing/2014/main" id="{918C3C97-444D-4600-8553-B9C4C1F8483B}"/>
+              </a:ext>
+            </a:extLst>
+          </p:cNvPr>
+          <p:cNvSpPr>
+            <a:spLocks noGrp="1"/>
+          </p:cNvSpPr>
+          <p:nvPr>
+            <p:ph type="ftr" sz="quarter" idx="11"/>
+          </p:nvPr>
+        </p:nvSpPr>
+        <p:spPr>
+          <a:xfrm>
+            <a:off x="4038600" y="6356350"/>
+            <a:ext cx="4114800" cy="365125"/>
+          </a:xfrm>
+        </p:spPr>
+        <p:txBody>
+          <a:bodyPr/>
+          <a:lstStyle/>
+          <a:p>
+            <a:r>
+              <a:rPr lang="en-US" dirty="0"/>
+              <a:t>MALWARE DETECTION USING ML</a:t>
+            </a:r>
+          </a:p>
+        </p:txBody>
+      </p:sp>
+      <p:sp>
+        <p:nvSpPr>
+          <p:cNvPr id="25" name="Slide Number Placeholder 24">
+            <a:extLst>
+              <a:ext uri="{FF2B5EF4-FFF2-40B4-BE49-F238E27FC236}">
+                <a16:creationId xmlns:a16="http://schemas.microsoft.com/office/drawing/2014/main" id="{148E9129-4CC6-47BA-ACD8-2C632A8660EC}"/>
+              </a:ext>
+            </a:extLst>
+          </p:cNvPr>
+          <p:cNvSpPr>
+            <a:spLocks noGrp="1"/>
+          </p:cNvSpPr>
+          <p:nvPr>
+            <p:ph type="sldNum" sz="quarter" idx="12"/>
+          </p:nvPr>
+        </p:nvSpPr>
+        <p:spPr>
+          <a:xfrm>
+            <a:off x="8610600" y="6356350"/>
+            <a:ext cx="2743200" cy="365125"/>
+          </a:xfrm>
+        </p:spPr>
+        <p:txBody>
+          <a:bodyPr/>
+          <a:lstStyle/>
+          <a:p>
+            <a:fld id="{A49DFD55-3C28-40EF-9E31-A92D2E4017FF}" type="slidenum">
+              <a:rPr lang="en-US" smtClean="0"/>
+              <a:pPr/>
+              <a:t>14</a:t>
+            </a:fld>
+            <a:endParaRPr lang="en-US" dirty="0"/>
+          </a:p>
+        </p:txBody>
+      </p:sp>
+      <p:sp>
+        <p:nvSpPr>
+          <p:cNvPr id="30" name="Text Placeholder 2">
+            <a:extLst>
+              <a:ext uri="{FF2B5EF4-FFF2-40B4-BE49-F238E27FC236}">
+                <a16:creationId xmlns:a16="http://schemas.microsoft.com/office/drawing/2014/main" id="{2B08B27E-2A72-5005-B775-C90B8F76DB05}"/>
+              </a:ext>
+            </a:extLst>
+          </p:cNvPr>
+          <p:cNvSpPr txBox="1">
+            <a:spLocks/>
+          </p:cNvSpPr>
+          <p:nvPr/>
+        </p:nvSpPr>
+        <p:spPr>
+          <a:xfrm>
+            <a:off x="3666968" y="5084524"/>
+            <a:ext cx="2317707" cy="737333"/>
+          </a:xfrm>
+          <a:prstGeom prst="rect">
+            <a:avLst/>
+          </a:prstGeom>
+        </p:spPr>
+        <p:txBody>
+          <a:bodyPr vert="horz" lIns="91440" tIns="45720" rIns="91440" bIns="45720" rtlCol="0" anchor="ctr">
+            <a:noAutofit/>
+          </a:bodyPr>
+          <a:lstStyle>
+            <a:lvl1pPr marL="0" indent="0" algn="ctr" defTabSz="914400" rtl="0" eaLnBrk="1" latinLnBrk="0" hangingPunct="1">
+              <a:lnSpc>
+                <a:spcPct val="90000"/>
+              </a:lnSpc>
+              <a:spcBef>
+                <a:spcPts val="1000"/>
+              </a:spcBef>
+              <a:buFont typeface="Arial" panose="020B0604020202020204" pitchFamily="34" charset="0"/>
+              <a:buNone/>
+              <a:defRPr lang="en-US" sz="1400" kern="1200" spc="150" baseline="0" dirty="0" smtClean="0">
+                <a:solidFill>
+                  <a:schemeClr val="tx1"/>
+                </a:solidFill>
+                <a:latin typeface="+mj-lt"/>
+                <a:ea typeface="+mj-ea"/>
+                <a:cs typeface="+mj-cs"/>
+              </a:defRPr>
+            </a:lvl1pPr>
+            <a:lvl2pPr marL="457200" indent="0" algn="l" defTabSz="914400" rtl="0" eaLnBrk="1" latinLnBrk="0" hangingPunct="1">
+              <a:lnSpc>
+                <a:spcPct val="90000"/>
+              </a:lnSpc>
+              <a:spcBef>
+                <a:spcPts val="500"/>
+              </a:spcBef>
+              <a:buFont typeface="Arial" panose="020B0604020202020204" pitchFamily="34" charset="0"/>
+              <a:buNone/>
+              <a:defRPr sz="2000" b="1" kern="1200">
+                <a:solidFill>
+                  <a:schemeClr val="tx1"/>
+                </a:solidFill>
+                <a:latin typeface="+mn-lt"/>
+                <a:ea typeface="+mn-ea"/>
+                <a:cs typeface="+mn-cs"/>
+              </a:defRPr>
+            </a:lvl2pPr>
+            <a:lvl3pPr marL="914400" indent="0" algn="l" defTabSz="914400" rtl="0" eaLnBrk="1" latinLnBrk="0" hangingPunct="1">
+              <a:lnSpc>
+                <a:spcPct val="90000"/>
+              </a:lnSpc>
+              <a:spcBef>
+                <a:spcPts val="500"/>
+              </a:spcBef>
+              <a:buFont typeface="Arial" panose="020B0604020202020204" pitchFamily="34" charset="0"/>
+              <a:buNone/>
+              <a:defRPr sz="1800" b="1" kern="1200">
+                <a:solidFill>
+                  <a:schemeClr val="tx1"/>
+                </a:solidFill>
+                <a:latin typeface="+mn-lt"/>
+                <a:ea typeface="+mn-ea"/>
+                <a:cs typeface="+mn-cs"/>
+              </a:defRPr>
+            </a:lvl3pPr>
+            <a:lvl4pPr marL="1371600" indent="0" algn="l" defTabSz="914400" rtl="0" eaLnBrk="1" latinLnBrk="0" hangingPunct="1">
+              <a:lnSpc>
+                <a:spcPct val="90000"/>
+              </a:lnSpc>
+              <a:spcBef>
+                <a:spcPts val="500"/>
+              </a:spcBef>
+              <a:buFont typeface="Arial" panose="020B0604020202020204" pitchFamily="34" charset="0"/>
+              <a:buNone/>
+              <a:defRPr sz="1600" b="1" kern="1200">
+                <a:solidFill>
+                  <a:schemeClr val="tx1"/>
+                </a:solidFill>
+                <a:latin typeface="+mn-lt"/>
+                <a:ea typeface="+mn-ea"/>
+                <a:cs typeface="+mn-cs"/>
+              </a:defRPr>
+            </a:lvl4pPr>
+            <a:lvl5pPr marL="1828800" indent="0" algn="l" defTabSz="914400" rtl="0" eaLnBrk="1" latinLnBrk="0" hangingPunct="1">
+              <a:lnSpc>
+                <a:spcPct val="90000"/>
+              </a:lnSpc>
+              <a:spcBef>
+                <a:spcPts val="500"/>
+              </a:spcBef>
+              <a:buFont typeface="Arial" panose="020B0604020202020204" pitchFamily="34" charset="0"/>
+              <a:buNone/>
+              <a:defRPr sz="1600" b="1" kern="1200">
+                <a:solidFill>
+                  <a:schemeClr val="tx1"/>
+                </a:solidFill>
+                <a:latin typeface="+mn-lt"/>
+                <a:ea typeface="+mn-ea"/>
+                <a:cs typeface="+mn-cs"/>
+              </a:defRPr>
+            </a:lvl5pPr>
+            <a:lvl6pPr marL="2286000" indent="0" algn="l" defTabSz="914400" rtl="0" eaLnBrk="1" latinLnBrk="0" hangingPunct="1">
+              <a:lnSpc>
+                <a:spcPct val="90000"/>
+              </a:lnSpc>
+              <a:spcBef>
+                <a:spcPts val="500"/>
+              </a:spcBef>
+              <a:buFont typeface="Arial" panose="020B0604020202020204" pitchFamily="34" charset="0"/>
+              <a:buNone/>
+              <a:defRPr sz="1600" b="1" kern="1200">
+                <a:solidFill>
+                  <a:schemeClr val="tx1"/>
+                </a:solidFill>
+                <a:latin typeface="+mn-lt"/>
+                <a:ea typeface="+mn-ea"/>
+                <a:cs typeface="+mn-cs"/>
+              </a:defRPr>
+            </a:lvl6pPr>
+            <a:lvl7pPr marL="2743200" indent="0" algn="l" defTabSz="914400" rtl="0" eaLnBrk="1" latinLnBrk="0" hangingPunct="1">
+              <a:lnSpc>
+                <a:spcPct val="90000"/>
+              </a:lnSpc>
+              <a:spcBef>
+                <a:spcPts val="500"/>
+              </a:spcBef>
+              <a:buFont typeface="Arial" panose="020B0604020202020204" pitchFamily="34" charset="0"/>
+              <a:buNone/>
+              <a:defRPr sz="1600" b="1" kern="1200">
+                <a:solidFill>
+                  <a:schemeClr val="tx1"/>
+                </a:solidFill>
+                <a:latin typeface="+mn-lt"/>
+                <a:ea typeface="+mn-ea"/>
+                <a:cs typeface="+mn-cs"/>
+              </a:defRPr>
+            </a:lvl7pPr>
+            <a:lvl8pPr marL="3200400" indent="0" algn="l" defTabSz="914400" rtl="0" eaLnBrk="1" latinLnBrk="0" hangingPunct="1">
+              <a:lnSpc>
+                <a:spcPct val="90000"/>
+              </a:lnSpc>
+              <a:spcBef>
+                <a:spcPts val="500"/>
+              </a:spcBef>
+              <a:buFont typeface="Arial" panose="020B0604020202020204" pitchFamily="34" charset="0"/>
+              <a:buNone/>
+              <a:defRPr sz="1600" b="1" kern="1200">
+                <a:solidFill>
+                  <a:schemeClr val="tx1"/>
+                </a:solidFill>
+                <a:latin typeface="+mn-lt"/>
+                <a:ea typeface="+mn-ea"/>
+                <a:cs typeface="+mn-cs"/>
+              </a:defRPr>
+            </a:lvl8pPr>
+            <a:lvl9pPr marL="3657600" indent="0" algn="l" defTabSz="914400" rtl="0" eaLnBrk="1" latinLnBrk="0" hangingPunct="1">
+              <a:lnSpc>
+                <a:spcPct val="90000"/>
+              </a:lnSpc>
+              <a:spcBef>
+                <a:spcPts val="500"/>
+              </a:spcBef>
+              <a:buFont typeface="Arial" panose="020B0604020202020204" pitchFamily="34" charset="0"/>
+              <a:buNone/>
+              <a:defRPr sz="1600" b="1" kern="1200">
+                <a:solidFill>
+                  <a:schemeClr val="tx1"/>
+                </a:solidFill>
+                <a:latin typeface="+mn-lt"/>
+                <a:ea typeface="+mn-ea"/>
+                <a:cs typeface="+mn-cs"/>
+              </a:defRPr>
+            </a:lvl9pPr>
+          </a:lstStyle>
+          <a:p>
+            <a:r>
+              <a:rPr lang="en-US" dirty="0"/>
+              <a:t>PRATHAM PATEL</a:t>
+            </a:r>
+          </a:p>
+          <a:p>
+            <a:r>
+              <a:rPr lang="en-US" sz="1200" dirty="0"/>
+              <a:t>191310132103</a:t>
+            </a:r>
+          </a:p>
+        </p:txBody>
+      </p:sp>
+      <p:sp>
+        <p:nvSpPr>
+          <p:cNvPr id="31" name="Text Placeholder 2">
+            <a:extLst>
+              <a:ext uri="{FF2B5EF4-FFF2-40B4-BE49-F238E27FC236}">
+                <a16:creationId xmlns:a16="http://schemas.microsoft.com/office/drawing/2014/main" id="{5066B11B-34FC-3E43-2799-B2E76C6199F2}"/>
+              </a:ext>
+            </a:extLst>
+          </p:cNvPr>
+          <p:cNvSpPr txBox="1">
+            <a:spLocks/>
+          </p:cNvSpPr>
+          <p:nvPr/>
+        </p:nvSpPr>
+        <p:spPr>
+          <a:xfrm>
+            <a:off x="6105368" y="5084523"/>
+            <a:ext cx="2317707" cy="737333"/>
+          </a:xfrm>
+          <a:prstGeom prst="rect">
+            <a:avLst/>
+          </a:prstGeom>
+        </p:spPr>
+        <p:txBody>
+          <a:bodyPr vert="horz" lIns="91440" tIns="45720" rIns="91440" bIns="45720" rtlCol="0" anchor="ctr">
+            <a:noAutofit/>
+          </a:bodyPr>
+          <a:lstStyle>
+            <a:lvl1pPr marL="0" indent="0" algn="ctr" defTabSz="914400" rtl="0" eaLnBrk="1" latinLnBrk="0" hangingPunct="1">
+              <a:lnSpc>
+                <a:spcPct val="90000"/>
+              </a:lnSpc>
+              <a:spcBef>
+                <a:spcPts val="1000"/>
+              </a:spcBef>
+              <a:buFont typeface="Arial" panose="020B0604020202020204" pitchFamily="34" charset="0"/>
+              <a:buNone/>
+              <a:defRPr lang="en-US" sz="1400" kern="1200" spc="150" baseline="0" dirty="0" smtClean="0">
+                <a:solidFill>
+                  <a:schemeClr val="tx1"/>
+                </a:solidFill>
+                <a:latin typeface="+mj-lt"/>
+                <a:ea typeface="+mj-ea"/>
+                <a:cs typeface="+mj-cs"/>
+              </a:defRPr>
+            </a:lvl1pPr>
+            <a:lvl2pPr marL="457200" indent="0" algn="l" defTabSz="914400" rtl="0" eaLnBrk="1" latinLnBrk="0" hangingPunct="1">
+              <a:lnSpc>
+                <a:spcPct val="90000"/>
+              </a:lnSpc>
+              <a:spcBef>
+                <a:spcPts val="500"/>
+              </a:spcBef>
+              <a:buFont typeface="Arial" panose="020B0604020202020204" pitchFamily="34" charset="0"/>
+              <a:buNone/>
+              <a:defRPr sz="2000" b="1" kern="1200">
+                <a:solidFill>
+                  <a:schemeClr val="tx1"/>
+                </a:solidFill>
+                <a:latin typeface="+mn-lt"/>
+                <a:ea typeface="+mn-ea"/>
+                <a:cs typeface="+mn-cs"/>
+              </a:defRPr>
+            </a:lvl2pPr>
+            <a:lvl3pPr marL="914400" indent="0" algn="l" defTabSz="914400" rtl="0" eaLnBrk="1" latinLnBrk="0" hangingPunct="1">
+              <a:lnSpc>
+                <a:spcPct val="90000"/>
+              </a:lnSpc>
+              <a:spcBef>
+                <a:spcPts val="500"/>
+              </a:spcBef>
+              <a:buFont typeface="Arial" panose="020B0604020202020204" pitchFamily="34" charset="0"/>
+              <a:buNone/>
+              <a:defRPr sz="1800" b="1" kern="1200">
+                <a:solidFill>
+                  <a:schemeClr val="tx1"/>
+                </a:solidFill>
+                <a:latin typeface="+mn-lt"/>
+                <a:ea typeface="+mn-ea"/>
+                <a:cs typeface="+mn-cs"/>
+              </a:defRPr>
+            </a:lvl3pPr>
+            <a:lvl4pPr marL="1371600" indent="0" algn="l" defTabSz="914400" rtl="0" eaLnBrk="1" latinLnBrk="0" hangingPunct="1">
+              <a:lnSpc>
+                <a:spcPct val="90000"/>
+              </a:lnSpc>
+              <a:spcBef>
+                <a:spcPts val="500"/>
+              </a:spcBef>
+              <a:buFont typeface="Arial" panose="020B0604020202020204" pitchFamily="34" charset="0"/>
+              <a:buNone/>
+              <a:defRPr sz="1600" b="1" kern="1200">
+                <a:solidFill>
+                  <a:schemeClr val="tx1"/>
+                </a:solidFill>
+                <a:latin typeface="+mn-lt"/>
+                <a:ea typeface="+mn-ea"/>
+                <a:cs typeface="+mn-cs"/>
+              </a:defRPr>
+            </a:lvl4pPr>
+            <a:lvl5pPr marL="1828800" indent="0" algn="l" defTabSz="914400" rtl="0" eaLnBrk="1" latinLnBrk="0" hangingPunct="1">
+              <a:lnSpc>
+                <a:spcPct val="90000"/>
+              </a:lnSpc>
+              <a:spcBef>
+                <a:spcPts val="500"/>
+              </a:spcBef>
+              <a:buFont typeface="Arial" panose="020B0604020202020204" pitchFamily="34" charset="0"/>
+              <a:buNone/>
+              <a:defRPr sz="1600" b="1" kern="1200">
+                <a:solidFill>
+                  <a:schemeClr val="tx1"/>
+                </a:solidFill>
+                <a:latin typeface="+mn-lt"/>
+                <a:ea typeface="+mn-ea"/>
+                <a:cs typeface="+mn-cs"/>
+              </a:defRPr>
+            </a:lvl5pPr>
+            <a:lvl6pPr marL="2286000" indent="0" algn="l" defTabSz="914400" rtl="0" eaLnBrk="1" latinLnBrk="0" hangingPunct="1">
+              <a:lnSpc>
+                <a:spcPct val="90000"/>
+              </a:lnSpc>
+              <a:spcBef>
+                <a:spcPts val="500"/>
+              </a:spcBef>
+              <a:buFont typeface="Arial" panose="020B0604020202020204" pitchFamily="34" charset="0"/>
+              <a:buNone/>
+              <a:defRPr sz="1600" b="1" kern="1200">
+                <a:solidFill>
+                  <a:schemeClr val="tx1"/>
+                </a:solidFill>
+                <a:latin typeface="+mn-lt"/>
+                <a:ea typeface="+mn-ea"/>
+                <a:cs typeface="+mn-cs"/>
+              </a:defRPr>
+            </a:lvl6pPr>
+            <a:lvl7pPr marL="2743200" indent="0" algn="l" defTabSz="914400" rtl="0" eaLnBrk="1" latinLnBrk="0" hangingPunct="1">
+              <a:lnSpc>
+                <a:spcPct val="90000"/>
+              </a:lnSpc>
+              <a:spcBef>
+                <a:spcPts val="500"/>
+              </a:spcBef>
+              <a:buFont typeface="Arial" panose="020B0604020202020204" pitchFamily="34" charset="0"/>
+              <a:buNone/>
+              <a:defRPr sz="1600" b="1" kern="1200">
+                <a:solidFill>
+                  <a:schemeClr val="tx1"/>
+                </a:solidFill>
+                <a:latin typeface="+mn-lt"/>
+                <a:ea typeface="+mn-ea"/>
+                <a:cs typeface="+mn-cs"/>
+              </a:defRPr>
+            </a:lvl7pPr>
+            <a:lvl8pPr marL="3200400" indent="0" algn="l" defTabSz="914400" rtl="0" eaLnBrk="1" latinLnBrk="0" hangingPunct="1">
+              <a:lnSpc>
+                <a:spcPct val="90000"/>
+              </a:lnSpc>
+              <a:spcBef>
+                <a:spcPts val="500"/>
+              </a:spcBef>
+              <a:buFont typeface="Arial" panose="020B0604020202020204" pitchFamily="34" charset="0"/>
+              <a:buNone/>
+              <a:defRPr sz="1600" b="1" kern="1200">
+                <a:solidFill>
+                  <a:schemeClr val="tx1"/>
+                </a:solidFill>
+                <a:latin typeface="+mn-lt"/>
+                <a:ea typeface="+mn-ea"/>
+                <a:cs typeface="+mn-cs"/>
+              </a:defRPr>
+            </a:lvl8pPr>
+            <a:lvl9pPr marL="3657600" indent="0" algn="l" defTabSz="914400" rtl="0" eaLnBrk="1" latinLnBrk="0" hangingPunct="1">
+              <a:lnSpc>
+                <a:spcPct val="90000"/>
+              </a:lnSpc>
+              <a:spcBef>
+                <a:spcPts val="500"/>
+              </a:spcBef>
+              <a:buFont typeface="Arial" panose="020B0604020202020204" pitchFamily="34" charset="0"/>
+              <a:buNone/>
+              <a:defRPr sz="1600" b="1" kern="1200">
+                <a:solidFill>
+                  <a:schemeClr val="tx1"/>
+                </a:solidFill>
+                <a:latin typeface="+mn-lt"/>
+                <a:ea typeface="+mn-ea"/>
+                <a:cs typeface="+mn-cs"/>
+              </a:defRPr>
+            </a:lvl9pPr>
+          </a:lstStyle>
+          <a:p>
+            <a:r>
+              <a:rPr lang="en-US" dirty="0"/>
+              <a:t>SHUBHAM PATEL</a:t>
+            </a:r>
+          </a:p>
+          <a:p>
+            <a:r>
+              <a:rPr lang="en-US" sz="1200" dirty="0"/>
+              <a:t>191310132108</a:t>
+            </a:r>
+          </a:p>
+        </p:txBody>
+      </p:sp>
+      <p:sp>
+        <p:nvSpPr>
+          <p:cNvPr id="32" name="Text Placeholder 2">
+            <a:extLst>
+              <a:ext uri="{FF2B5EF4-FFF2-40B4-BE49-F238E27FC236}">
+                <a16:creationId xmlns:a16="http://schemas.microsoft.com/office/drawing/2014/main" id="{4ADE42FC-37B8-2E40-DC87-0D9B09411AB9}"/>
+              </a:ext>
+            </a:extLst>
+          </p:cNvPr>
+          <p:cNvSpPr txBox="1">
+            <a:spLocks/>
+          </p:cNvSpPr>
+          <p:nvPr/>
+        </p:nvSpPr>
+        <p:spPr>
+          <a:xfrm>
+            <a:off x="8548984" y="5084523"/>
+            <a:ext cx="2317707" cy="737333"/>
+          </a:xfrm>
+          <a:prstGeom prst="rect">
+            <a:avLst/>
+          </a:prstGeom>
+        </p:spPr>
+        <p:txBody>
+          <a:bodyPr vert="horz" lIns="91440" tIns="45720" rIns="91440" bIns="45720" rtlCol="0" anchor="ctr">
+            <a:noAutofit/>
+          </a:bodyPr>
+          <a:lstStyle>
+            <a:lvl1pPr marL="0" indent="0" algn="ctr" defTabSz="914400" rtl="0" eaLnBrk="1" latinLnBrk="0" hangingPunct="1">
+              <a:lnSpc>
+                <a:spcPct val="90000"/>
+              </a:lnSpc>
+              <a:spcBef>
+                <a:spcPts val="1000"/>
+              </a:spcBef>
+              <a:buFont typeface="Arial" panose="020B0604020202020204" pitchFamily="34" charset="0"/>
+              <a:buNone/>
+              <a:defRPr lang="en-US" sz="1400" kern="1200" spc="150" baseline="0" dirty="0" smtClean="0">
+                <a:solidFill>
+                  <a:schemeClr val="tx1"/>
+                </a:solidFill>
+                <a:latin typeface="+mj-lt"/>
+                <a:ea typeface="+mj-ea"/>
+                <a:cs typeface="+mj-cs"/>
+              </a:defRPr>
+            </a:lvl1pPr>
+            <a:lvl2pPr marL="457200" indent="0" algn="l" defTabSz="914400" rtl="0" eaLnBrk="1" latinLnBrk="0" hangingPunct="1">
+              <a:lnSpc>
+                <a:spcPct val="90000"/>
+              </a:lnSpc>
+              <a:spcBef>
+                <a:spcPts val="500"/>
+              </a:spcBef>
+              <a:buFont typeface="Arial" panose="020B0604020202020204" pitchFamily="34" charset="0"/>
+              <a:buNone/>
+              <a:defRPr sz="2000" b="1" kern="1200">
+                <a:solidFill>
+                  <a:schemeClr val="tx1"/>
+                </a:solidFill>
+                <a:latin typeface="+mn-lt"/>
+                <a:ea typeface="+mn-ea"/>
+                <a:cs typeface="+mn-cs"/>
+              </a:defRPr>
+            </a:lvl2pPr>
+            <a:lvl3pPr marL="914400" indent="0" algn="l" defTabSz="914400" rtl="0" eaLnBrk="1" latinLnBrk="0" hangingPunct="1">
+              <a:lnSpc>
+                <a:spcPct val="90000"/>
+              </a:lnSpc>
+              <a:spcBef>
+                <a:spcPts val="500"/>
+              </a:spcBef>
+              <a:buFont typeface="Arial" panose="020B0604020202020204" pitchFamily="34" charset="0"/>
+              <a:buNone/>
+              <a:defRPr sz="1800" b="1" kern="1200">
+                <a:solidFill>
+                  <a:schemeClr val="tx1"/>
+                </a:solidFill>
+                <a:latin typeface="+mn-lt"/>
+                <a:ea typeface="+mn-ea"/>
+                <a:cs typeface="+mn-cs"/>
+              </a:defRPr>
+            </a:lvl3pPr>
+            <a:lvl4pPr marL="1371600" indent="0" algn="l" defTabSz="914400" rtl="0" eaLnBrk="1" latinLnBrk="0" hangingPunct="1">
+              <a:lnSpc>
+                <a:spcPct val="90000"/>
+              </a:lnSpc>
+              <a:spcBef>
+                <a:spcPts val="500"/>
+              </a:spcBef>
+              <a:buFont typeface="Arial" panose="020B0604020202020204" pitchFamily="34" charset="0"/>
+              <a:buNone/>
+              <a:defRPr sz="1600" b="1" kern="1200">
+                <a:solidFill>
+                  <a:schemeClr val="tx1"/>
+                </a:solidFill>
+                <a:latin typeface="+mn-lt"/>
+                <a:ea typeface="+mn-ea"/>
+                <a:cs typeface="+mn-cs"/>
+              </a:defRPr>
+            </a:lvl4pPr>
+            <a:lvl5pPr marL="1828800" indent="0" algn="l" defTabSz="914400" rtl="0" eaLnBrk="1" latinLnBrk="0" hangingPunct="1">
+              <a:lnSpc>
+                <a:spcPct val="90000"/>
+              </a:lnSpc>
+              <a:spcBef>
+                <a:spcPts val="500"/>
+              </a:spcBef>
+              <a:buFont typeface="Arial" panose="020B0604020202020204" pitchFamily="34" charset="0"/>
+              <a:buNone/>
+              <a:defRPr sz="1600" b="1" kern="1200">
+                <a:solidFill>
+                  <a:schemeClr val="tx1"/>
+                </a:solidFill>
+                <a:latin typeface="+mn-lt"/>
+                <a:ea typeface="+mn-ea"/>
+                <a:cs typeface="+mn-cs"/>
+              </a:defRPr>
+            </a:lvl5pPr>
+            <a:lvl6pPr marL="2286000" indent="0" algn="l" defTabSz="914400" rtl="0" eaLnBrk="1" latinLnBrk="0" hangingPunct="1">
+              <a:lnSpc>
+                <a:spcPct val="90000"/>
+              </a:lnSpc>
+              <a:spcBef>
+                <a:spcPts val="500"/>
+              </a:spcBef>
+              <a:buFont typeface="Arial" panose="020B0604020202020204" pitchFamily="34" charset="0"/>
+              <a:buNone/>
+              <a:defRPr sz="1600" b="1" kern="1200">
+                <a:solidFill>
+                  <a:schemeClr val="tx1"/>
+                </a:solidFill>
+                <a:latin typeface="+mn-lt"/>
+                <a:ea typeface="+mn-ea"/>
+                <a:cs typeface="+mn-cs"/>
+              </a:defRPr>
+            </a:lvl6pPr>
+            <a:lvl7pPr marL="2743200" indent="0" algn="l" defTabSz="914400" rtl="0" eaLnBrk="1" latinLnBrk="0" hangingPunct="1">
+              <a:lnSpc>
+                <a:spcPct val="90000"/>
+              </a:lnSpc>
+              <a:spcBef>
+                <a:spcPts val="500"/>
+              </a:spcBef>
+              <a:buFont typeface="Arial" panose="020B0604020202020204" pitchFamily="34" charset="0"/>
+              <a:buNone/>
+              <a:defRPr sz="1600" b="1" kern="1200">
+                <a:solidFill>
+                  <a:schemeClr val="tx1"/>
+                </a:solidFill>
+                <a:latin typeface="+mn-lt"/>
+                <a:ea typeface="+mn-ea"/>
+                <a:cs typeface="+mn-cs"/>
+              </a:defRPr>
+            </a:lvl7pPr>
+            <a:lvl8pPr marL="3200400" indent="0" algn="l" defTabSz="914400" rtl="0" eaLnBrk="1" latinLnBrk="0" hangingPunct="1">
+              <a:lnSpc>
+                <a:spcPct val="90000"/>
+              </a:lnSpc>
+              <a:spcBef>
+                <a:spcPts val="500"/>
+              </a:spcBef>
+              <a:buFont typeface="Arial" panose="020B0604020202020204" pitchFamily="34" charset="0"/>
+              <a:buNone/>
+              <a:defRPr sz="1600" b="1" kern="1200">
+                <a:solidFill>
+                  <a:schemeClr val="tx1"/>
+                </a:solidFill>
+                <a:latin typeface="+mn-lt"/>
+                <a:ea typeface="+mn-ea"/>
+                <a:cs typeface="+mn-cs"/>
+              </a:defRPr>
+            </a:lvl8pPr>
+            <a:lvl9pPr marL="3657600" indent="0" algn="l" defTabSz="914400" rtl="0" eaLnBrk="1" latinLnBrk="0" hangingPunct="1">
+              <a:lnSpc>
+                <a:spcPct val="90000"/>
+              </a:lnSpc>
+              <a:spcBef>
+                <a:spcPts val="500"/>
+              </a:spcBef>
+              <a:buFont typeface="Arial" panose="020B0604020202020204" pitchFamily="34" charset="0"/>
+              <a:buNone/>
+              <a:defRPr sz="1600" b="1" kern="1200">
+                <a:solidFill>
+                  <a:schemeClr val="tx1"/>
+                </a:solidFill>
+                <a:latin typeface="+mn-lt"/>
+                <a:ea typeface="+mn-ea"/>
+                <a:cs typeface="+mn-cs"/>
+              </a:defRPr>
+            </a:lvl9pPr>
+          </a:lstStyle>
+          <a:p>
+            <a:r>
+              <a:rPr lang="en-US" dirty="0"/>
+              <a:t>YASH SONI</a:t>
+            </a:r>
+          </a:p>
+          <a:p>
+            <a:r>
+              <a:rPr lang="en-US" sz="1200" dirty="0"/>
+              <a:t>191310132020</a:t>
+            </a:r>
+          </a:p>
+        </p:txBody>
+      </p:sp>
+      <p:pic>
+        <p:nvPicPr>
+          <p:cNvPr id="19" name="Picture Placeholder 18" descr="A person with a beard&#10;&#10;Description automatically generated with medium confidence">
+            <a:extLst>
+              <a:ext uri="{FF2B5EF4-FFF2-40B4-BE49-F238E27FC236}">
+                <a16:creationId xmlns:a16="http://schemas.microsoft.com/office/drawing/2014/main" id="{EC4FBEEA-DA75-3B70-B5B4-C52406435A5E}"/>
+              </a:ext>
+            </a:extLst>
+          </p:cNvPr>
+          <p:cNvPicPr>
+            <a:picLocks noGrp="1" noChangeAspect="1"/>
+          </p:cNvPicPr>
+          <p:nvPr>
+            <p:ph type="pic" sz="quarter" idx="15"/>
+          </p:nvPr>
+        </p:nvPicPr>
+        <p:blipFill rotWithShape="1">
+          <a:blip r:embed="rId2"/>
+          <a:srcRect l="-3605" t="9340" r="3566" b="44193"/>
+          <a:stretch/>
+        </p:blipFill>
+        <p:spPr>
+          <a:xfrm>
+            <a:off x="3836914" y="2886074"/>
+            <a:ext cx="1845511" cy="1845511"/>
+          </a:xfrm>
+        </p:spPr>
+      </p:pic>
+      <p:pic>
+        <p:nvPicPr>
+          <p:cNvPr id="11" name="Picture Placeholder 10" descr="A person sitting on a rock&#10;&#10;Description automatically generated with medium confidence">
+            <a:extLst>
+              <a:ext uri="{FF2B5EF4-FFF2-40B4-BE49-F238E27FC236}">
+                <a16:creationId xmlns:a16="http://schemas.microsoft.com/office/drawing/2014/main" id="{2771F5C5-D1EB-41BC-6E08-30B4D85F7925}"/>
+              </a:ext>
+            </a:extLst>
+          </p:cNvPr>
+          <p:cNvPicPr>
+            <a:picLocks noGrp="1" noChangeAspect="1"/>
+          </p:cNvPicPr>
+          <p:nvPr>
+            <p:ph type="pic" sz="quarter" idx="17"/>
+          </p:nvPr>
+        </p:nvPicPr>
+        <p:blipFill rotWithShape="1">
+          <a:blip r:embed="rId3"/>
+          <a:srcRect l="40432" t="3484" r="30430" b="73015"/>
+          <a:stretch/>
+        </p:blipFill>
+        <p:spPr>
+          <a:xfrm>
+            <a:off x="8747458" y="2886074"/>
+            <a:ext cx="1845511" cy="1845511"/>
+          </a:xfrm>
+        </p:spPr>
+      </p:pic>
+      <p:pic>
+        <p:nvPicPr>
+          <p:cNvPr id="7" name="Picture Placeholder 6" descr="A person wearing glasses&#10;&#10;Description automatically generated with medium confidence">
+            <a:extLst>
+              <a:ext uri="{FF2B5EF4-FFF2-40B4-BE49-F238E27FC236}">
+                <a16:creationId xmlns:a16="http://schemas.microsoft.com/office/drawing/2014/main" id="{05AA776C-EFC7-558A-75F4-9C354AD6F295}"/>
+              </a:ext>
+            </a:extLst>
+          </p:cNvPr>
+          <p:cNvPicPr>
+            <a:picLocks noGrp="1" noChangeAspect="1"/>
+          </p:cNvPicPr>
+          <p:nvPr>
+            <p:ph type="pic" sz="quarter" idx="16"/>
+          </p:nvPr>
+        </p:nvPicPr>
+        <p:blipFill rotWithShape="1">
+          <a:blip r:embed="rId4"/>
+          <a:srcRect l="7237" t="10322" r="-2001" b="39955"/>
+          <a:stretch/>
+        </p:blipFill>
+        <p:spPr>
+          <a:xfrm>
+            <a:off x="6327578" y="2886074"/>
+            <a:ext cx="1845511" cy="1845511"/>
+          </a:xfrm>
+        </p:spPr>
+      </p:pic>
+      <p:pic>
+        <p:nvPicPr>
+          <p:cNvPr id="12" name="Picture Placeholder 11" descr="A person with a mustache&#10;&#10;Description automatically generated with medium confidence">
+            <a:extLst>
+              <a:ext uri="{FF2B5EF4-FFF2-40B4-BE49-F238E27FC236}">
+                <a16:creationId xmlns:a16="http://schemas.microsoft.com/office/drawing/2014/main" id="{19EAF837-4DBC-57A7-D1F1-6C31D8E9AD1B}"/>
+              </a:ext>
+            </a:extLst>
+          </p:cNvPr>
+          <p:cNvPicPr>
+            <a:picLocks noGrp="1" noChangeAspect="1"/>
+          </p:cNvPicPr>
+          <p:nvPr>
+            <p:ph type="pic" sz="quarter" idx="14"/>
+          </p:nvPr>
+        </p:nvPicPr>
+        <p:blipFill rotWithShape="1">
+          <a:blip r:embed="rId5"/>
+          <a:srcRect l="18286" t="23429" r="19540" b="41568"/>
+          <a:stretch/>
+        </p:blipFill>
+        <p:spPr>
+          <a:xfrm>
+            <a:off x="1487181" y="2886074"/>
+            <a:ext cx="1845511" cy="1845511"/>
+          </a:xfrm>
+        </p:spPr>
+      </p:pic>
+    </p:spTree>
+    <p:extLst>
+      <p:ext uri="{BB962C8B-B14F-4D97-AF65-F5344CB8AC3E}">
+        <p14:creationId xmlns:p14="http://schemas.microsoft.com/office/powerpoint/2010/main" val="2619301236"/>
+      </p:ext>
+    </p:extLst>
+  </p:cSld>
+  <p:clrMapOvr>
+    <a:masterClrMapping/>
+  </p:clrMapOvr>
+</p:sld>
+</file>
+
+<file path=ppt/slides/slide15.xml><?xml version="1.0" encoding="utf-8"?>
+<p:sld xmlns:a="http://schemas.openxmlformats.org/drawingml/2006/main" xmlns:r="http://schemas.openxmlformats.org/officeDocument/2006/relationships" xmlns:p="http://schemas.openxmlformats.org/presentationml/2006/main">
+  <p:cSld>
+    <p:spTree>
+      <p:nvGrpSpPr>
+        <p:cNvPr id="1" name=""/>
+        <p:cNvGrpSpPr/>
+        <p:nvPr/>
+      </p:nvGrpSpPr>
+      <p:grpSpPr>
+        <a:xfrm>
+          <a:off x="0" y="0"/>
+          <a:ext cx="0" cy="0"/>
+          <a:chOff x="0" y="0"/>
+          <a:chExt cx="0" cy="0"/>
+        </a:xfrm>
+      </p:grpSpPr>
+      <p:sp>
+        <p:nvSpPr>
+          <p:cNvPr id="2" name="Title 1">
+            <a:extLst>
+              <a:ext uri="{FF2B5EF4-FFF2-40B4-BE49-F238E27FC236}">
+                <a16:creationId xmlns:a16="http://schemas.microsoft.com/office/drawing/2014/main" id="{4518FC28-E0BD-4387-B8BE-9965D1A57FF1}"/>
+              </a:ext>
+            </a:extLst>
+          </p:cNvPr>
+          <p:cNvSpPr>
+            <a:spLocks noGrp="1"/>
+          </p:cNvSpPr>
+          <p:nvPr>
+            <p:ph type="title"/>
+          </p:nvPr>
+        </p:nvSpPr>
+        <p:spPr>
+          <a:xfrm>
+            <a:off x="5476875" y="1671639"/>
+            <a:ext cx="5111750" cy="1204912"/>
+          </a:xfrm>
+        </p:spPr>
+        <p:txBody>
+          <a:bodyPr/>
+          <a:lstStyle/>
+          <a:p>
+            <a:r>
+              <a:rPr lang="en-US" dirty="0"/>
+              <a:t>SUMMARY</a:t>
+            </a:r>
+          </a:p>
+        </p:txBody>
+      </p:sp>
+      <p:sp>
+        <p:nvSpPr>
+          <p:cNvPr id="3" name="Text Placeholder 2">
+            <a:extLst>
+              <a:ext uri="{FF2B5EF4-FFF2-40B4-BE49-F238E27FC236}">
+                <a16:creationId xmlns:a16="http://schemas.microsoft.com/office/drawing/2014/main" id="{FED19BCA-B61F-4EA6-A1FB-CCA3BD8506FB}"/>
+              </a:ext>
+            </a:extLst>
+          </p:cNvPr>
+          <p:cNvSpPr>
+            <a:spLocks noGrp="1"/>
+          </p:cNvSpPr>
+          <p:nvPr>
+            <p:ph type="body" idx="1"/>
+          </p:nvPr>
+        </p:nvSpPr>
+        <p:spPr>
+          <a:xfrm>
+            <a:off x="5476874" y="3660773"/>
+            <a:ext cx="5576607" cy="2426262"/>
           </a:xfrm>
         </p:spPr>
         <p:txBody>
@@ -15520,6 +16449,241 @@
           <a:p>
             <a:r>
               <a:rPr lang="en-US" dirty="0"/>
+              <a:t>So far, for malware detection using ML, we’ve done basic data cleaning, vectorization of log files, application and visualization of ML using Weka and </a:t>
+            </a:r>
+            <a:r>
+              <a:rPr lang="en-US" dirty="0" err="1"/>
+              <a:t>Sklearn</a:t>
+            </a:r>
+            <a:r>
+              <a:rPr lang="en-US" dirty="0"/>
+              <a:t>, </a:t>
+            </a:r>
+            <a:r>
+              <a:rPr lang="en-US" dirty="0" err="1"/>
+              <a:t>Tensorflow</a:t>
+            </a:r>
+            <a:r>
+              <a:rPr lang="en-US" dirty="0"/>
+              <a:t>.</a:t>
+            </a:r>
+          </a:p>
+          <a:p>
+            <a:r>
+              <a:rPr lang="en-US" dirty="0"/>
+              <a:t>	We then found a new dataset including 100 </a:t>
+            </a:r>
+            <a:r>
+              <a:rPr lang="en-US" dirty="0" err="1"/>
+              <a:t>api</a:t>
+            </a:r>
+            <a:r>
+              <a:rPr lang="en-US" dirty="0"/>
+              <a:t> calls from the files and built traditional as well as deep learning models on it. Lastly, we deployed and hosted the best model on external server for public access.</a:t>
+            </a:r>
+          </a:p>
+          <a:p>
+            <a:r>
+              <a:rPr lang="en-US" dirty="0"/>
+              <a:t>In the upcoming weeks, we’re planning to complete the required documentation for the project.</a:t>
+            </a:r>
+          </a:p>
+        </p:txBody>
+      </p:sp>
+      <p:sp>
+        <p:nvSpPr>
+          <p:cNvPr id="4" name="Date Placeholder 3">
+            <a:extLst>
+              <a:ext uri="{FF2B5EF4-FFF2-40B4-BE49-F238E27FC236}">
+                <a16:creationId xmlns:a16="http://schemas.microsoft.com/office/drawing/2014/main" id="{00560550-EE65-43CE-B899-F421E74287A1}"/>
+              </a:ext>
+            </a:extLst>
+          </p:cNvPr>
+          <p:cNvSpPr>
+            <a:spLocks noGrp="1"/>
+          </p:cNvSpPr>
+          <p:nvPr>
+            <p:ph type="dt" sz="half" idx="10"/>
+          </p:nvPr>
+        </p:nvSpPr>
+        <p:spPr>
+          <a:xfrm>
+            <a:off x="838200" y="6356350"/>
+            <a:ext cx="2743200" cy="365125"/>
+          </a:xfrm>
+        </p:spPr>
+        <p:txBody>
+          <a:bodyPr/>
+          <a:lstStyle/>
+          <a:p>
+            <a:r>
+              <a:rPr lang="en-US" dirty="0"/>
+              <a:t>20XX</a:t>
+            </a:r>
+          </a:p>
+        </p:txBody>
+      </p:sp>
+      <p:sp>
+        <p:nvSpPr>
+          <p:cNvPr id="5" name="Footer Placeholder 4">
+            <a:extLst>
+              <a:ext uri="{FF2B5EF4-FFF2-40B4-BE49-F238E27FC236}">
+                <a16:creationId xmlns:a16="http://schemas.microsoft.com/office/drawing/2014/main" id="{4135E32A-1A8C-43D2-9C6E-12887B4DEDFB}"/>
+              </a:ext>
+            </a:extLst>
+          </p:cNvPr>
+          <p:cNvSpPr>
+            <a:spLocks noGrp="1"/>
+          </p:cNvSpPr>
+          <p:nvPr>
+            <p:ph type="ftr" sz="quarter" idx="11"/>
+          </p:nvPr>
+        </p:nvSpPr>
+        <p:spPr>
+          <a:xfrm>
+            <a:off x="4038600" y="6356350"/>
+            <a:ext cx="4114800" cy="365125"/>
+          </a:xfrm>
+        </p:spPr>
+        <p:txBody>
+          <a:bodyPr/>
+          <a:lstStyle/>
+          <a:p>
+            <a:r>
+              <a:rPr lang="en-US" dirty="0"/>
+              <a:t>PRESENTATION TITLE</a:t>
+            </a:r>
+          </a:p>
+        </p:txBody>
+      </p:sp>
+      <p:sp>
+        <p:nvSpPr>
+          <p:cNvPr id="6" name="Slide Number Placeholder 5">
+            <a:extLst>
+              <a:ext uri="{FF2B5EF4-FFF2-40B4-BE49-F238E27FC236}">
+                <a16:creationId xmlns:a16="http://schemas.microsoft.com/office/drawing/2014/main" id="{7C4B8313-9270-4128-8674-3A3E42B806BC}"/>
+              </a:ext>
+            </a:extLst>
+          </p:cNvPr>
+          <p:cNvSpPr>
+            <a:spLocks noGrp="1"/>
+          </p:cNvSpPr>
+          <p:nvPr>
+            <p:ph type="sldNum" sz="quarter" idx="12"/>
+          </p:nvPr>
+        </p:nvSpPr>
+        <p:spPr>
+          <a:xfrm>
+            <a:off x="8610600" y="6356350"/>
+            <a:ext cx="2743200" cy="365125"/>
+          </a:xfrm>
+        </p:spPr>
+        <p:txBody>
+          <a:bodyPr/>
+          <a:lstStyle/>
+          <a:p>
+            <a:fld id="{A49DFD55-3C28-40EF-9E31-A92D2E4017FF}" type="slidenum">
+              <a:rPr lang="en-US" smtClean="0"/>
+              <a:pPr/>
+              <a:t>15</a:t>
+            </a:fld>
+            <a:endParaRPr lang="en-US" dirty="0"/>
+          </a:p>
+        </p:txBody>
+      </p:sp>
+    </p:spTree>
+    <p:extLst>
+      <p:ext uri="{BB962C8B-B14F-4D97-AF65-F5344CB8AC3E}">
+        <p14:creationId xmlns:p14="http://schemas.microsoft.com/office/powerpoint/2010/main" val="1742861620"/>
+      </p:ext>
+    </p:extLst>
+  </p:cSld>
+  <p:clrMapOvr>
+    <a:masterClrMapping/>
+  </p:clrMapOvr>
+</p:sld>
+</file>
+
+<file path=ppt/slides/slide16.xml><?xml version="1.0" encoding="utf-8"?>
+<p:sld xmlns:a="http://schemas.openxmlformats.org/drawingml/2006/main" xmlns:r="http://schemas.openxmlformats.org/officeDocument/2006/relationships" xmlns:p="http://schemas.openxmlformats.org/presentationml/2006/main">
+  <p:cSld>
+    <p:spTree>
+      <p:nvGrpSpPr>
+        <p:cNvPr id="1" name=""/>
+        <p:cNvGrpSpPr/>
+        <p:nvPr/>
+      </p:nvGrpSpPr>
+      <p:grpSpPr>
+        <a:xfrm>
+          <a:off x="0" y="0"/>
+          <a:ext cx="0" cy="0"/>
+          <a:chOff x="0" y="0"/>
+          <a:chExt cx="0" cy="0"/>
+        </a:xfrm>
+      </p:grpSpPr>
+      <p:sp>
+        <p:nvSpPr>
+          <p:cNvPr id="2" name="Title 1">
+            <a:extLst>
+              <a:ext uri="{FF2B5EF4-FFF2-40B4-BE49-F238E27FC236}">
+                <a16:creationId xmlns:a16="http://schemas.microsoft.com/office/drawing/2014/main" id="{8BDF1EDE-5423-435C-B149-87AB1BC22B83}"/>
+              </a:ext>
+            </a:extLst>
+          </p:cNvPr>
+          <p:cNvSpPr>
+            <a:spLocks noGrp="1"/>
+          </p:cNvSpPr>
+          <p:nvPr>
+            <p:ph type="ctrTitle"/>
+          </p:nvPr>
+        </p:nvSpPr>
+        <p:spPr>
+          <a:xfrm>
+            <a:off x="4267200" y="1615736"/>
+            <a:ext cx="4179570" cy="1524735"/>
+          </a:xfrm>
+        </p:spPr>
+        <p:txBody>
+          <a:bodyPr/>
+          <a:lstStyle/>
+          <a:p>
+            <a:r>
+              <a:rPr lang="en-US" dirty="0"/>
+              <a:t>THANK YOU</a:t>
+            </a:r>
+          </a:p>
+        </p:txBody>
+      </p:sp>
+      <p:sp>
+        <p:nvSpPr>
+          <p:cNvPr id="3" name="Subtitle 2">
+            <a:extLst>
+              <a:ext uri="{FF2B5EF4-FFF2-40B4-BE49-F238E27FC236}">
+                <a16:creationId xmlns:a16="http://schemas.microsoft.com/office/drawing/2014/main" id="{AF64C29E-DF30-4DC6-AB95-2016F9A703B6}"/>
+              </a:ext>
+            </a:extLst>
+          </p:cNvPr>
+          <p:cNvSpPr>
+            <a:spLocks noGrp="1"/>
+          </p:cNvSpPr>
+          <p:nvPr>
+            <p:ph type="subTitle" idx="1"/>
+          </p:nvPr>
+        </p:nvSpPr>
+        <p:spPr>
+          <a:xfrm>
+            <a:off x="4267199" y="3238103"/>
+            <a:ext cx="7413813" cy="1773168"/>
+          </a:xfrm>
+        </p:spPr>
+        <p:txBody>
+          <a:bodyPr>
+            <a:normAutofit/>
+          </a:bodyPr>
+          <a:lstStyle/>
+          <a:p>
+            <a:r>
+              <a:rPr lang="en-US" dirty="0"/>
               <a:t>Shashank Sharma</a:t>
             </a:r>
           </a:p>
@@ -15647,7 +16811,7 @@
             <a:fld id="{A49DFD55-3C28-40EF-9E31-A92D2E4017FF}" type="slidenum">
               <a:rPr lang="en-US" smtClean="0"/>
               <a:pPr/>
-              <a:t>13</a:t>
+              <a:t>16</a:t>
             </a:fld>
             <a:endParaRPr lang="en-US" dirty="0"/>
           </a:p>
@@ -15735,11 +16899,13 @@
         <p:spPr>
           <a:xfrm>
             <a:off x="1333500" y="2924175"/>
-            <a:ext cx="2895600" cy="2519363"/>
-          </a:xfrm>
-        </p:spPr>
-        <p:txBody>
-          <a:bodyPr/>
+            <a:ext cx="2895600" cy="3252507"/>
+          </a:xfrm>
+        </p:spPr>
+        <p:txBody>
+          <a:bodyPr>
+            <a:normAutofit/>
+          </a:bodyPr>
           <a:lstStyle/>
           <a:p>
             <a:r>
@@ -15756,6 +16922,12 @@
           <a:p>
             <a:r>
               <a:rPr lang="en-US" dirty="0"/>
+              <a:t>Malware Analysis</a:t>
+            </a:r>
+          </a:p>
+          <a:p>
+            <a:r>
+              <a:rPr lang="en-US" dirty="0"/>
               <a:t>Primary goals of Project</a:t>
             </a:r>
           </a:p>
@@ -15763,6 +16935,12 @@
             <a:r>
               <a:rPr lang="en-US" dirty="0"/>
               <a:t>Project Timeline</a:t>
+            </a:r>
+          </a:p>
+          <a:p>
+            <a:r>
+              <a:rPr lang="en-US" dirty="0"/>
+              <a:t>Dataset EDA</a:t>
             </a:r>
           </a:p>
           <a:p>
@@ -16247,26 +17425,45 @@
             </a:r>
             <a:r>
               <a:rPr lang="en-US" dirty="0"/>
-              <a:t>: Detect the number of malware files and benign files from a given </a:t>
+              <a:t>: Detect Malware files in a system using ML Techniques.</a:t>
+            </a:r>
+          </a:p>
+          <a:p>
+            <a:r>
+              <a:rPr lang="en-US" b="1" u="sng" dirty="0"/>
+              <a:t>Objective</a:t>
+            </a:r>
+            <a:r>
+              <a:rPr lang="en-US" dirty="0"/>
+              <a:t>: Binary Classification of files as malware or benign, based on its behavioral analysis, through API call sequence-based log file. Various ML and DL algorithms is used for the model development.</a:t>
+            </a:r>
+          </a:p>
+          <a:p>
+            <a:r>
+              <a:rPr lang="en-US" b="1" u="sng" dirty="0"/>
+              <a:t>Tools and Technologies:</a:t>
+            </a:r>
+            <a:r>
+              <a:rPr lang="en-US" dirty="0"/>
+              <a:t> </a:t>
             </a:r>
             <a:r>
               <a:rPr lang="en-US" dirty="0" err="1"/>
-              <a:t>api</a:t>
+              <a:t>Jupyter</a:t>
             </a:r>
             <a:r>
               <a:rPr lang="en-US" dirty="0"/>
-              <a:t>-call sequence log file of set of files.</a:t>
-            </a:r>
-          </a:p>
-          <a:p>
-            <a:r>
-              <a:rPr lang="en-US" b="1" u="sng" dirty="0"/>
-              <a:t>Need</a:t>
+              <a:t> Notebook, PyCharm, Amazon Web Services (AWS), Git, </a:t>
+            </a:r>
+            <a:r>
+              <a:rPr lang="en-US" dirty="0" err="1"/>
+              <a:t>Github</a:t>
             </a:r>
             <a:r>
               <a:rPr lang="en-US" dirty="0"/>
-              <a:t>: Quick Insights about malware files, as manual detection takes a lot of time.</a:t>
-            </a:r>
+              <a:t>, Fast-API.</a:t>
+            </a:r>
+            <a:endParaRPr lang="en-US" b="1" u="sng" dirty="0"/>
           </a:p>
         </p:txBody>
       </p:sp>
@@ -16404,35 +17601,67 @@
         </p:nvSpPr>
         <p:spPr>
           <a:xfrm>
-            <a:off x="4958839" y="723567"/>
-            <a:ext cx="1969522" cy="546819"/>
-          </a:xfrm>
-        </p:spPr>
+            <a:off x="5276406" y="1486948"/>
+            <a:ext cx="1639186" cy="546819"/>
+          </a:xfrm>
+        </p:spPr>
+        <p:txBody>
+          <a:bodyPr>
+            <a:normAutofit/>
+          </a:bodyPr>
+          <a:lstStyle/>
+          <a:p>
+            <a:r>
+              <a:rPr lang="en-US" sz="2200" dirty="0">
+                <a:latin typeface="+mn-lt"/>
+              </a:rPr>
+              <a:t>MALWARE</a:t>
+            </a:r>
+          </a:p>
+        </p:txBody>
+      </p:sp>
+      <p:sp>
+        <p:nvSpPr>
+          <p:cNvPr id="4" name="Date Placeholder 3">
+            <a:extLst>
+              <a:ext uri="{FF2B5EF4-FFF2-40B4-BE49-F238E27FC236}">
+                <a16:creationId xmlns:a16="http://schemas.microsoft.com/office/drawing/2014/main" id="{8F6DFF1F-9E2E-0B67-DB4E-EA390F3F8A4E}"/>
+              </a:ext>
+            </a:extLst>
+          </p:cNvPr>
+          <p:cNvSpPr>
+            <a:spLocks noGrp="1"/>
+          </p:cNvSpPr>
+          <p:nvPr>
+            <p:ph type="dt" sz="half" idx="10"/>
+          </p:nvPr>
+        </p:nvSpPr>
+        <p:spPr/>
         <p:txBody>
           <a:bodyPr/>
           <a:lstStyle/>
           <a:p>
             <a:r>
               <a:rPr lang="en-US" dirty="0"/>
-              <a:t>MALWARE</a:t>
-            </a:r>
-          </a:p>
-        </p:txBody>
-      </p:sp>
-      <p:sp>
-        <p:nvSpPr>
-          <p:cNvPr id="4" name="Date Placeholder 3">
-            <a:extLst>
-              <a:ext uri="{FF2B5EF4-FFF2-40B4-BE49-F238E27FC236}">
-                <a16:creationId xmlns:a16="http://schemas.microsoft.com/office/drawing/2014/main" id="{8F6DFF1F-9E2E-0B67-DB4E-EA390F3F8A4E}"/>
-              </a:ext>
-            </a:extLst>
-          </p:cNvPr>
-          <p:cNvSpPr>
-            <a:spLocks noGrp="1"/>
-          </p:cNvSpPr>
-          <p:nvPr>
-            <p:ph type="dt" sz="half" idx="10"/>
+              <a:t>2023</a:t>
+            </a:r>
+          </a:p>
+        </p:txBody>
+      </p:sp>
+      <p:sp>
+        <p:nvSpPr>
+          <p:cNvPr id="5" name="Footer Placeholder 4">
+            <a:extLst>
+              <a:ext uri="{FF2B5EF4-FFF2-40B4-BE49-F238E27FC236}">
+                <a16:creationId xmlns:a16="http://schemas.microsoft.com/office/drawing/2014/main" id="{13513409-3027-8479-101D-6E0577974D16}"/>
+              </a:ext>
+            </a:extLst>
+          </p:cNvPr>
+          <p:cNvSpPr>
+            <a:spLocks noGrp="1"/>
+          </p:cNvSpPr>
+          <p:nvPr>
+            <p:ph type="ftr" sz="quarter" idx="11"/>
           </p:nvPr>
         </p:nvSpPr>
         <p:spPr/>
@@ -16441,39 +17670,9 @@
           <a:lstStyle/>
           <a:p>
             <a:r>
-              <a:rPr lang="en-US"/>
-              <a:t>20XX</a:t>
-            </a:r>
-            <a:endParaRPr lang="en-US" dirty="0"/>
-          </a:p>
-        </p:txBody>
-      </p:sp>
-      <p:sp>
-        <p:nvSpPr>
-          <p:cNvPr id="5" name="Footer Placeholder 4">
-            <a:extLst>
-              <a:ext uri="{FF2B5EF4-FFF2-40B4-BE49-F238E27FC236}">
-                <a16:creationId xmlns:a16="http://schemas.microsoft.com/office/drawing/2014/main" id="{13513409-3027-8479-101D-6E0577974D16}"/>
-              </a:ext>
-            </a:extLst>
-          </p:cNvPr>
-          <p:cNvSpPr>
-            <a:spLocks noGrp="1"/>
-          </p:cNvSpPr>
-          <p:nvPr>
-            <p:ph type="ftr" sz="quarter" idx="11"/>
-          </p:nvPr>
-        </p:nvSpPr>
-        <p:spPr/>
-        <p:txBody>
-          <a:bodyPr/>
-          <a:lstStyle/>
-          <a:p>
-            <a:r>
-              <a:rPr lang="en-US"/>
-              <a:t>PRESENTATION TITLE</a:t>
-            </a:r>
-            <a:endParaRPr lang="en-US" dirty="0"/>
+              <a:rPr lang="en-US" dirty="0"/>
+              <a:t>MALWARE DETECTION USING ML</a:t>
+            </a:r>
           </a:p>
         </p:txBody>
       </p:sp>
@@ -16523,8 +17722,8 @@
         </p:nvSpPr>
         <p:spPr>
           <a:xfrm>
-            <a:off x="1225039" y="3010670"/>
-            <a:ext cx="1969522" cy="546819"/>
+            <a:off x="1705215" y="3157155"/>
+            <a:ext cx="1238761" cy="529189"/>
           </a:xfrm>
           <a:prstGeom prst="rect">
             <a:avLst/>
@@ -16555,7 +17754,9 @@
           </a:lstStyle>
           <a:p>
             <a:r>
-              <a:rPr lang="en-US" u="sng" dirty="0"/>
+              <a:rPr lang="en-US" sz="2200" u="sng" dirty="0">
+                <a:latin typeface="+mn-lt"/>
+              </a:rPr>
               <a:t>STATIC</a:t>
             </a:r>
           </a:p>
@@ -16577,8 +17778,8 @@
         </p:nvSpPr>
         <p:spPr>
           <a:xfrm>
-            <a:off x="8997439" y="3010670"/>
-            <a:ext cx="1969522" cy="546819"/>
+            <a:off x="9130719" y="3135968"/>
+            <a:ext cx="1489346" cy="546819"/>
           </a:xfrm>
           <a:prstGeom prst="rect">
             <a:avLst/>
@@ -16609,7 +17810,9 @@
           </a:lstStyle>
           <a:p>
             <a:r>
-              <a:rPr lang="en-US" u="sng" dirty="0"/>
+              <a:rPr lang="en-US" sz="2200" u="sng" dirty="0">
+                <a:latin typeface="+mn-lt"/>
+              </a:rPr>
               <a:t>DYNAMIC</a:t>
             </a:r>
           </a:p>
@@ -16625,6 +17828,7 @@
             </a:extLst>
           </p:cNvPr>
           <p:cNvCxnSpPr>
+            <a:cxnSpLocks/>
             <a:stCxn id="2" idx="2"/>
             <a:endCxn id="12" idx="0"/>
           </p:cNvCxnSpPr>
@@ -16632,8 +17836,8 @@
         </p:nvCxnSpPr>
         <p:spPr>
           <a:xfrm rot="5400000">
-            <a:off x="3206558" y="273628"/>
-            <a:ext cx="1740284" cy="3733800"/>
+            <a:off x="3648604" y="709760"/>
+            <a:ext cx="1123388" cy="3771403"/>
           </a:xfrm>
           <a:prstGeom prst="curvedConnector3">
             <a:avLst/>
@@ -16670,6 +17874,7 @@
             </a:extLst>
           </p:cNvPr>
           <p:cNvCxnSpPr>
+            <a:cxnSpLocks/>
             <a:stCxn id="2" idx="2"/>
             <a:endCxn id="13" idx="0"/>
           </p:cNvCxnSpPr>
@@ -16677,8 +17882,8 @@
         </p:nvCxnSpPr>
         <p:spPr>
           <a:xfrm rot="16200000" flipH="1">
-            <a:off x="7092758" y="121228"/>
-            <a:ext cx="1740284" cy="4038600"/>
+            <a:off x="7434595" y="695170"/>
+            <a:ext cx="1102201" cy="3779393"/>
           </a:xfrm>
           <a:prstGeom prst="curvedConnector3">
             <a:avLst/>
@@ -17559,8 +18764,8 @@
         </p:nvSpPr>
         <p:spPr>
           <a:xfrm>
-            <a:off x="8809586" y="3010670"/>
-            <a:ext cx="2354045" cy="663032"/>
+            <a:off x="8812305" y="3144512"/>
+            <a:ext cx="2108749" cy="529189"/>
           </a:xfrm>
           <a:prstGeom prst="roundRect">
             <a:avLst/>
@@ -17594,6 +18799,43 @@
           <a:p>
             <a:pPr algn="ctr"/>
             <a:endParaRPr lang="en-US" dirty="0"/>
+          </a:p>
+        </p:txBody>
+      </p:sp>
+      <p:sp>
+        <p:nvSpPr>
+          <p:cNvPr id="10" name="TextBox 9">
+            <a:extLst>
+              <a:ext uri="{FF2B5EF4-FFF2-40B4-BE49-F238E27FC236}">
+                <a16:creationId xmlns:a16="http://schemas.microsoft.com/office/drawing/2014/main" id="{54F80467-1BAE-991A-531C-847CAC35B50C}"/>
+              </a:ext>
+            </a:extLst>
+          </p:cNvPr>
+          <p:cNvSpPr txBox="1"/>
+          <p:nvPr/>
+        </p:nvSpPr>
+        <p:spPr>
+          <a:xfrm>
+            <a:off x="4178594" y="529709"/>
+            <a:ext cx="3834809" cy="523220"/>
+          </a:xfrm>
+          <a:prstGeom prst="rect">
+            <a:avLst/>
+          </a:prstGeom>
+          <a:noFill/>
+        </p:spPr>
+        <p:txBody>
+          <a:bodyPr wrap="square" rtlCol="0">
+            <a:spAutoFit/>
+          </a:bodyPr>
+          <a:lstStyle/>
+          <a:p>
+            <a:r>
+              <a:rPr lang="en-US" sz="2800" dirty="0">
+                <a:latin typeface="+mj-lt"/>
+              </a:rPr>
+              <a:t>MALWARE ANALYSIS</a:t>
+            </a:r>
           </a:p>
         </p:txBody>
       </p:sp>
@@ -17739,7 +18981,7 @@
             <p:ph type="dgm" sz="quarter" idx="15"/>
             <p:extLst>
               <p:ext uri="{D42A27DB-BD31-4B8C-83A1-F6EECF244321}">
-                <p14:modId xmlns:p14="http://schemas.microsoft.com/office/powerpoint/2010/main" val="1699420686"/>
+                <p14:modId xmlns:p14="http://schemas.microsoft.com/office/powerpoint/2010/main" val="934829670"/>
               </p:ext>
             </p:extLst>
           </p:nvPr>
@@ -18208,7 +19450,7 @@
         </p:nvSpPr>
         <p:spPr>
           <a:xfrm>
-            <a:off x="5576937" y="3755394"/>
+            <a:off x="5576937" y="3764359"/>
             <a:ext cx="5693589" cy="1010842"/>
           </a:xfrm>
         </p:spPr>
@@ -18544,7 +19786,7 @@
           <a:p>
             <a:r>
               <a:rPr lang="en-US" sz="3600" dirty="0"/>
-              <a:t>PREVIOUS WORK</a:t>
+              <a:t>TIMELINE</a:t>
             </a:r>
           </a:p>
         </p:txBody>
@@ -19354,25 +20596,6 @@
 </file>
 
 <file path=customXml/item1.xml><?xml version="1.0" encoding="utf-8"?>
-<p:properties xmlns:p="http://schemas.microsoft.com/office/2006/metadata/properties" xmlns:xsi="http://www.w3.org/2001/XMLSchema-instance" xmlns:pc="http://schemas.microsoft.com/office/infopath/2007/PartnerControls">
-  <documentManagement>
-    <_ip_UnifiedCompliancePolicyUIAction xmlns="http://schemas.microsoft.com/sharepoint/v3" xsi:nil="true"/>
-    <Image xmlns="71af3243-3dd4-4a8d-8c0d-dd76da1f02a5">
-      <Url xsi:nil="true"/>
-      <Description xsi:nil="true"/>
-    </Image>
-    <Status xmlns="71af3243-3dd4-4a8d-8c0d-dd76da1f02a5">Not started</Status>
-    <_ip_UnifiedCompliancePolicyProperties xmlns="http://schemas.microsoft.com/sharepoint/v3" xsi:nil="true"/>
-    <ImageTagsTaxHTField xmlns="71af3243-3dd4-4a8d-8c0d-dd76da1f02a5">
-      <Terms xmlns="http://schemas.microsoft.com/office/infopath/2007/PartnerControls"/>
-    </ImageTagsTaxHTField>
-    <TaxCatchAll xmlns="230e9df3-be65-4c73-a93b-d1236ebd677e"/>
-    <MediaServiceKeyPoints xmlns="71af3243-3dd4-4a8d-8c0d-dd76da1f02a5" xsi:nil="true"/>
-  </documentManagement>
-</p:properties>
-</file>
-
-<file path=customXml/item2.xml><?xml version="1.0" encoding="utf-8"?>
 <?mso-contentType ?>
 <FormTemplates xmlns="http://schemas.microsoft.com/sharepoint/v3/contenttype/forms">
   <Display>DocumentLibraryForm</Display>
@@ -19381,7 +20604,7 @@
 </FormTemplates>
 </file>
 
-<file path=customXml/item3.xml><?xml version="1.0" encoding="utf-8"?>
+<file path=customXml/item2.xml><?xml version="1.0" encoding="utf-8"?>
 <ct:contentTypeSchema xmlns:ct="http://schemas.microsoft.com/office/2006/metadata/contentType" xmlns:ma="http://schemas.microsoft.com/office/2006/metadata/properties/metaAttributes" ct:_="" ma:_="" ma:contentTypeName="Document" ma:contentTypeID="0x01010079F111ED35F8CC479449609E8A0923A6" ma:contentTypeVersion="20" ma:contentTypeDescription="Create a new document." ma:contentTypeScope="" ma:versionID="1267097ee5f5874adfcc408041ae252e">
   <xsd:schema xmlns:xsd="http://www.w3.org/2001/XMLSchema" xmlns:xs="http://www.w3.org/2001/XMLSchema" xmlns:p="http://schemas.microsoft.com/office/2006/metadata/properties" xmlns:ns1="http://schemas.microsoft.com/sharepoint/v3" xmlns:ns2="71af3243-3dd4-4a8d-8c0d-dd76da1f02a5" xmlns:ns3="16c05727-aa75-4e4a-9b5f-8a80a1165891" xmlns:ns4="230e9df3-be65-4c73-a93b-d1236ebd677e" targetNamespace="http://schemas.microsoft.com/office/2006/metadata/properties" ma:root="true" ma:fieldsID="395891a93df65b14727750f2c06c306c" ns1:_="" ns2:_="" ns3:_="" ns4:_="">
     <xsd:import namespace="http://schemas.microsoft.com/sharepoint/v3"/>
@@ -19657,19 +20880,26 @@
 </ct:contentTypeSchema>
 </file>
 
-<file path=customXml/itemProps1.xml><?xml version="1.0" encoding="utf-8"?>
-<ds:datastoreItem xmlns:ds="http://schemas.openxmlformats.org/officeDocument/2006/customXml" ds:itemID="{29C43685-694E-4579-B109-3C418D49DA65}">
-  <ds:schemaRefs>
-    <ds:schemaRef ds:uri="http://schemas.microsoft.com/office/2006/metadata/properties"/>
-    <ds:schemaRef ds:uri="http://schemas.microsoft.com/office/infopath/2007/PartnerControls"/>
-    <ds:schemaRef ds:uri="http://schemas.microsoft.com/sharepoint/v3"/>
-    <ds:schemaRef ds:uri="71af3243-3dd4-4a8d-8c0d-dd76da1f02a5"/>
-    <ds:schemaRef ds:uri="230e9df3-be65-4c73-a93b-d1236ebd677e"/>
-  </ds:schemaRefs>
-</ds:datastoreItem>
+<file path=customXml/item3.xml><?xml version="1.0" encoding="utf-8"?>
+<p:properties xmlns:p="http://schemas.microsoft.com/office/2006/metadata/properties" xmlns:xsi="http://www.w3.org/2001/XMLSchema-instance" xmlns:pc="http://schemas.microsoft.com/office/infopath/2007/PartnerControls">
+  <documentManagement>
+    <_ip_UnifiedCompliancePolicyUIAction xmlns="http://schemas.microsoft.com/sharepoint/v3" xsi:nil="true"/>
+    <Image xmlns="71af3243-3dd4-4a8d-8c0d-dd76da1f02a5">
+      <Url xsi:nil="true"/>
+      <Description xsi:nil="true"/>
+    </Image>
+    <Status xmlns="71af3243-3dd4-4a8d-8c0d-dd76da1f02a5">Not started</Status>
+    <_ip_UnifiedCompliancePolicyProperties xmlns="http://schemas.microsoft.com/sharepoint/v3" xsi:nil="true"/>
+    <ImageTagsTaxHTField xmlns="71af3243-3dd4-4a8d-8c0d-dd76da1f02a5">
+      <Terms xmlns="http://schemas.microsoft.com/office/infopath/2007/PartnerControls"/>
+    </ImageTagsTaxHTField>
+    <TaxCatchAll xmlns="230e9df3-be65-4c73-a93b-d1236ebd677e"/>
+    <MediaServiceKeyPoints xmlns="71af3243-3dd4-4a8d-8c0d-dd76da1f02a5" xsi:nil="true"/>
+  </documentManagement>
+</p:properties>
 </file>
 
-<file path=customXml/itemProps2.xml><?xml version="1.0" encoding="utf-8"?>
+<file path=customXml/itemProps1.xml><?xml version="1.0" encoding="utf-8"?>
 <ds:datastoreItem xmlns:ds="http://schemas.openxmlformats.org/officeDocument/2006/customXml" ds:itemID="{0FD6FE22-81A0-4500-AFD0-342D21BB9A2C}">
   <ds:schemaRefs>
     <ds:schemaRef ds:uri="http://schemas.microsoft.com/sharepoint/v3/contenttype/forms"/>
@@ -19677,7 +20907,7 @@
 </ds:datastoreItem>
 </file>
 
-<file path=customXml/itemProps3.xml><?xml version="1.0" encoding="utf-8"?>
+<file path=customXml/itemProps2.xml><?xml version="1.0" encoding="utf-8"?>
 <ds:datastoreItem xmlns:ds="http://schemas.openxmlformats.org/officeDocument/2006/customXml" ds:itemID="{CC96B61E-1B64-430F-934F-7D1B90028029}">
   <ds:schemaRefs>
     <ds:schemaRef ds:uri="http://schemas.microsoft.com/office/2006/metadata/contentType"/>
@@ -19698,6 +20928,18 @@
 </ds:datastoreItem>
 </file>
 
+<file path=customXml/itemProps3.xml><?xml version="1.0" encoding="utf-8"?>
+<ds:datastoreItem xmlns:ds="http://schemas.openxmlformats.org/officeDocument/2006/customXml" ds:itemID="{29C43685-694E-4579-B109-3C418D49DA65}">
+  <ds:schemaRefs>
+    <ds:schemaRef ds:uri="http://schemas.microsoft.com/office/2006/metadata/properties"/>
+    <ds:schemaRef ds:uri="http://schemas.microsoft.com/office/infopath/2007/PartnerControls"/>
+    <ds:schemaRef ds:uri="http://schemas.microsoft.com/sharepoint/v3"/>
+    <ds:schemaRef ds:uri="71af3243-3dd4-4a8d-8c0d-dd76da1f02a5"/>
+    <ds:schemaRef ds:uri="230e9df3-be65-4c73-a93b-d1236ebd677e"/>
+  </ds:schemaRefs>
+</ds:datastoreItem>
+</file>
+
 <file path=docMetadata/LabelInfo.xml><?xml version="1.0" encoding="utf-8"?>
 <clbl:labelList xmlns:clbl="http://schemas.microsoft.com/office/2020/mipLabelMetadata">
   <clbl:label id="{f42aa342-8706-4288-bd11-ebb85995028c}" enabled="1" method="Standard" siteId="{72f988bf-86f1-41af-91ab-2d7cd011db47}" removed="0"/>

</xml_diff>